<commit_message>
Tinkered with Puzzle to add more context
</commit_message>
<xml_diff>
--- a/02 Exercise 2 - Puzzle/Architecture_Workshop_Exercise_2_Understand.pptx
+++ b/02 Exercise 2 - Puzzle/Architecture_Workshop_Exercise_2_Understand.pptx
@@ -12,8 +12,8 @@
     <p:sldId id="303" r:id="rId3"/>
     <p:sldId id="301" r:id="rId4"/>
     <p:sldId id="305" r:id="rId5"/>
-    <p:sldId id="306" r:id="rId6"/>
-    <p:sldId id="307" r:id="rId7"/>
+    <p:sldId id="307" r:id="rId6"/>
+    <p:sldId id="306" r:id="rId7"/>
     <p:sldId id="299" r:id="rId8"/>
     <p:sldId id="302" r:id="rId9"/>
   </p:sldIdLst>
@@ -114,6 +114,36 @@
       </a:defRPr>
     </a:lvl9pPr>
   </p:defaultTextStyle>
+  <p:extLst>
+    <p:ext uri="{EFAFB233-063F-42B5-8137-9DF3F51BA10A}">
+      <p15:sldGuideLst xmlns:p15="http://schemas.microsoft.com/office/powerpoint/2012/main">
+        <p15:guide id="1" orient="horz" pos="2160">
+          <p15:clr>
+            <a:srgbClr val="A4A3A4"/>
+          </p15:clr>
+        </p15:guide>
+        <p15:guide id="2" pos="2880">
+          <p15:clr>
+            <a:srgbClr val="A4A3A4"/>
+          </p15:clr>
+        </p15:guide>
+      </p15:sldGuideLst>
+    </p:ext>
+    <p:ext uri="{2D200454-40CA-4A62-9FC3-DE9A4176ACB9}">
+      <p15:notesGuideLst xmlns:p15="http://schemas.microsoft.com/office/powerpoint/2012/main">
+        <p15:guide id="1" orient="horz" pos="3126">
+          <p15:clr>
+            <a:srgbClr val="A4A3A4"/>
+          </p15:clr>
+        </p15:guide>
+        <p15:guide id="2" pos="2141">
+          <p15:clr>
+            <a:srgbClr val="A4A3A4"/>
+          </p15:clr>
+        </p15:guide>
+      </p15:notesGuideLst>
+    </p:ext>
+  </p:extLst>
 </p:presentation>
 </file>
 
@@ -199,7 +229,7 @@
           <a:p>
             <a:fld id="{14BAE693-6910-45CC-A0F0-E7002C65F0F7}" type="datetimeFigureOut">
               <a:rPr lang="en-GB" smtClean="0"/>
-              <a:t>07/03/16</a:t>
+              <a:t>21/05/2018</a:t>
             </a:fld>
             <a:endParaRPr lang="en-GB"/>
           </a:p>
@@ -263,35 +293,35 @@
           <a:p>
             <a:pPr lvl="0"/>
             <a:r>
-              <a:rPr lang="en-US" smtClean="0"/>
+              <a:rPr lang="en-US"/>
               <a:t>Click to edit Master text styles</a:t>
             </a:r>
           </a:p>
           <a:p>
             <a:pPr lvl="1"/>
             <a:r>
-              <a:rPr lang="en-US" smtClean="0"/>
+              <a:rPr lang="en-US"/>
               <a:t>Second level</a:t>
             </a:r>
           </a:p>
           <a:p>
             <a:pPr lvl="2"/>
             <a:r>
-              <a:rPr lang="en-US" smtClean="0"/>
+              <a:rPr lang="en-US"/>
               <a:t>Third level</a:t>
             </a:r>
           </a:p>
           <a:p>
             <a:pPr lvl="3"/>
             <a:r>
-              <a:rPr lang="en-US" smtClean="0"/>
+              <a:rPr lang="en-US"/>
               <a:t>Fourth level</a:t>
             </a:r>
           </a:p>
           <a:p>
             <a:pPr lvl="4"/>
             <a:r>
-              <a:rPr lang="en-US" smtClean="0"/>
+              <a:rPr lang="en-US"/>
               <a:t>Fifth level</a:t>
             </a:r>
             <a:endParaRPr lang="en-GB"/>
@@ -1177,10 +1207,9 @@
           <a:lstStyle/>
           <a:p>
             <a:r>
-              <a:rPr lang="en-US" smtClean="0"/>
+              <a:rPr lang="en-US"/>
               <a:t>Click to edit Master title style</a:t>
             </a:r>
-            <a:endParaRPr lang="en-US"/>
           </a:p>
         </p:txBody>
       </p:sp>
@@ -1296,10 +1325,9 @@
           </a:lstStyle>
           <a:p>
             <a:r>
-              <a:rPr lang="en-US" smtClean="0"/>
+              <a:rPr lang="en-US"/>
               <a:t>Click to edit Master subtitle style</a:t>
             </a:r>
-            <a:endParaRPr lang="en-US"/>
           </a:p>
         </p:txBody>
       </p:sp>
@@ -1321,7 +1349,7 @@
             <a:fld id="{1D8BD707-D9CF-40AE-B4C6-C98DA3205C09}" type="datetimeFigureOut">
               <a:rPr lang="en-US" smtClean="0"/>
               <a:pPr/>
-              <a:t>07/03/16</a:t>
+              <a:t>5/21/18</a:t>
             </a:fld>
             <a:endParaRPr lang="en-US"/>
           </a:p>
@@ -1411,10 +1439,9 @@
           <a:lstStyle/>
           <a:p>
             <a:r>
-              <a:rPr lang="en-US" smtClean="0"/>
+              <a:rPr lang="en-US"/>
               <a:t>Click to edit Master title style</a:t>
             </a:r>
-            <a:endParaRPr lang="en-US"/>
           </a:p>
         </p:txBody>
       </p:sp>
@@ -1435,38 +1462,37 @@
           <a:p>
             <a:pPr lvl="0"/>
             <a:r>
-              <a:rPr lang="en-US" smtClean="0"/>
+              <a:rPr lang="en-US"/>
               <a:t>Click to edit Master text styles</a:t>
             </a:r>
           </a:p>
           <a:p>
             <a:pPr lvl="1"/>
             <a:r>
-              <a:rPr lang="en-US" smtClean="0"/>
+              <a:rPr lang="en-US"/>
               <a:t>Second level</a:t>
             </a:r>
           </a:p>
           <a:p>
             <a:pPr lvl="2"/>
             <a:r>
-              <a:rPr lang="en-US" smtClean="0"/>
+              <a:rPr lang="en-US"/>
               <a:t>Third level</a:t>
             </a:r>
           </a:p>
           <a:p>
             <a:pPr lvl="3"/>
             <a:r>
-              <a:rPr lang="en-US" smtClean="0"/>
+              <a:rPr lang="en-US"/>
               <a:t>Fourth level</a:t>
             </a:r>
           </a:p>
           <a:p>
             <a:pPr lvl="4"/>
             <a:r>
-              <a:rPr lang="en-US" smtClean="0"/>
+              <a:rPr lang="en-US"/>
               <a:t>Fifth level</a:t>
             </a:r>
-            <a:endParaRPr lang="en-US"/>
           </a:p>
         </p:txBody>
       </p:sp>
@@ -1488,7 +1514,7 @@
             <a:fld id="{1D8BD707-D9CF-40AE-B4C6-C98DA3205C09}" type="datetimeFigureOut">
               <a:rPr lang="en-US" smtClean="0"/>
               <a:pPr/>
-              <a:t>07/03/16</a:t>
+              <a:t>5/21/18</a:t>
             </a:fld>
             <a:endParaRPr lang="en-US"/>
           </a:p>
@@ -1583,10 +1609,9 @@
           <a:lstStyle/>
           <a:p>
             <a:r>
-              <a:rPr lang="en-US" smtClean="0"/>
+              <a:rPr lang="en-US"/>
               <a:t>Click to edit Master title style</a:t>
             </a:r>
-            <a:endParaRPr lang="en-US"/>
           </a:p>
         </p:txBody>
       </p:sp>
@@ -1612,38 +1637,37 @@
           <a:p>
             <a:pPr lvl="0"/>
             <a:r>
-              <a:rPr lang="en-US" smtClean="0"/>
+              <a:rPr lang="en-US"/>
               <a:t>Click to edit Master text styles</a:t>
             </a:r>
           </a:p>
           <a:p>
             <a:pPr lvl="1"/>
             <a:r>
-              <a:rPr lang="en-US" smtClean="0"/>
+              <a:rPr lang="en-US"/>
               <a:t>Second level</a:t>
             </a:r>
           </a:p>
           <a:p>
             <a:pPr lvl="2"/>
             <a:r>
-              <a:rPr lang="en-US" smtClean="0"/>
+              <a:rPr lang="en-US"/>
               <a:t>Third level</a:t>
             </a:r>
           </a:p>
           <a:p>
             <a:pPr lvl="3"/>
             <a:r>
-              <a:rPr lang="en-US" smtClean="0"/>
+              <a:rPr lang="en-US"/>
               <a:t>Fourth level</a:t>
             </a:r>
           </a:p>
           <a:p>
             <a:pPr lvl="4"/>
             <a:r>
-              <a:rPr lang="en-US" smtClean="0"/>
+              <a:rPr lang="en-US"/>
               <a:t>Fifth level</a:t>
             </a:r>
-            <a:endParaRPr lang="en-US"/>
           </a:p>
         </p:txBody>
       </p:sp>
@@ -1665,7 +1689,7 @@
             <a:fld id="{1D8BD707-D9CF-40AE-B4C6-C98DA3205C09}" type="datetimeFigureOut">
               <a:rPr lang="en-US" smtClean="0"/>
               <a:pPr/>
-              <a:t>07/03/16</a:t>
+              <a:t>5/21/18</a:t>
             </a:fld>
             <a:endParaRPr lang="en-US"/>
           </a:p>
@@ -1755,10 +1779,9 @@
           <a:lstStyle/>
           <a:p>
             <a:r>
-              <a:rPr lang="en-US" smtClean="0"/>
+              <a:rPr lang="en-US"/>
               <a:t>Click to edit Master title style</a:t>
             </a:r>
-            <a:endParaRPr lang="en-US"/>
           </a:p>
         </p:txBody>
       </p:sp>
@@ -1779,38 +1802,37 @@
           <a:p>
             <a:pPr lvl="0"/>
             <a:r>
-              <a:rPr lang="en-US" smtClean="0"/>
+              <a:rPr lang="en-US"/>
               <a:t>Click to edit Master text styles</a:t>
             </a:r>
           </a:p>
           <a:p>
             <a:pPr lvl="1"/>
             <a:r>
-              <a:rPr lang="en-US" smtClean="0"/>
+              <a:rPr lang="en-US"/>
               <a:t>Second level</a:t>
             </a:r>
           </a:p>
           <a:p>
             <a:pPr lvl="2"/>
             <a:r>
-              <a:rPr lang="en-US" smtClean="0"/>
+              <a:rPr lang="en-US"/>
               <a:t>Third level</a:t>
             </a:r>
           </a:p>
           <a:p>
             <a:pPr lvl="3"/>
             <a:r>
-              <a:rPr lang="en-US" smtClean="0"/>
+              <a:rPr lang="en-US"/>
               <a:t>Fourth level</a:t>
             </a:r>
           </a:p>
           <a:p>
             <a:pPr lvl="4"/>
             <a:r>
-              <a:rPr lang="en-US" smtClean="0"/>
+              <a:rPr lang="en-US"/>
               <a:t>Fifth level</a:t>
             </a:r>
-            <a:endParaRPr lang="en-US"/>
           </a:p>
         </p:txBody>
       </p:sp>
@@ -1832,7 +1854,7 @@
             <a:fld id="{1D8BD707-D9CF-40AE-B4C6-C98DA3205C09}" type="datetimeFigureOut">
               <a:rPr lang="en-US" smtClean="0"/>
               <a:pPr/>
-              <a:t>07/03/16</a:t>
+              <a:t>5/21/18</a:t>
             </a:fld>
             <a:endParaRPr lang="en-US"/>
           </a:p>
@@ -1931,10 +1953,9 @@
           </a:lstStyle>
           <a:p>
             <a:r>
-              <a:rPr lang="en-US" smtClean="0"/>
+              <a:rPr lang="en-US"/>
               <a:t>Click to edit Master title style</a:t>
             </a:r>
-            <a:endParaRPr lang="en-US"/>
           </a:p>
         </p:txBody>
       </p:sp>
@@ -2051,7 +2072,7 @@
           <a:p>
             <a:pPr lvl="0"/>
             <a:r>
-              <a:rPr lang="en-US" smtClean="0"/>
+              <a:rPr lang="en-US"/>
               <a:t>Click to edit Master text styles</a:t>
             </a:r>
           </a:p>
@@ -2075,7 +2096,7 @@
             <a:fld id="{1D8BD707-D9CF-40AE-B4C6-C98DA3205C09}" type="datetimeFigureOut">
               <a:rPr lang="en-US" smtClean="0"/>
               <a:pPr/>
-              <a:t>07/03/16</a:t>
+              <a:t>5/21/18</a:t>
             </a:fld>
             <a:endParaRPr lang="en-US"/>
           </a:p>
@@ -2165,10 +2186,9 @@
           <a:lstStyle/>
           <a:p>
             <a:r>
-              <a:rPr lang="en-US" smtClean="0"/>
+              <a:rPr lang="en-US"/>
               <a:t>Click to edit Master title style</a:t>
             </a:r>
-            <a:endParaRPr lang="en-US"/>
           </a:p>
         </p:txBody>
       </p:sp>
@@ -2222,38 +2242,37 @@
           <a:p>
             <a:pPr lvl="0"/>
             <a:r>
-              <a:rPr lang="en-US" smtClean="0"/>
+              <a:rPr lang="en-US"/>
               <a:t>Click to edit Master text styles</a:t>
             </a:r>
           </a:p>
           <a:p>
             <a:pPr lvl="1"/>
             <a:r>
-              <a:rPr lang="en-US" smtClean="0"/>
+              <a:rPr lang="en-US"/>
               <a:t>Second level</a:t>
             </a:r>
           </a:p>
           <a:p>
             <a:pPr lvl="2"/>
             <a:r>
-              <a:rPr lang="en-US" smtClean="0"/>
+              <a:rPr lang="en-US"/>
               <a:t>Third level</a:t>
             </a:r>
           </a:p>
           <a:p>
             <a:pPr lvl="3"/>
             <a:r>
-              <a:rPr lang="en-US" smtClean="0"/>
+              <a:rPr lang="en-US"/>
               <a:t>Fourth level</a:t>
             </a:r>
           </a:p>
           <a:p>
             <a:pPr lvl="4"/>
             <a:r>
-              <a:rPr lang="en-US" smtClean="0"/>
+              <a:rPr lang="en-US"/>
               <a:t>Fifth level</a:t>
             </a:r>
-            <a:endParaRPr lang="en-US"/>
           </a:p>
         </p:txBody>
       </p:sp>
@@ -2307,38 +2326,37 @@
           <a:p>
             <a:pPr lvl="0"/>
             <a:r>
-              <a:rPr lang="en-US" smtClean="0"/>
+              <a:rPr lang="en-US"/>
               <a:t>Click to edit Master text styles</a:t>
             </a:r>
           </a:p>
           <a:p>
             <a:pPr lvl="1"/>
             <a:r>
-              <a:rPr lang="en-US" smtClean="0"/>
+              <a:rPr lang="en-US"/>
               <a:t>Second level</a:t>
             </a:r>
           </a:p>
           <a:p>
             <a:pPr lvl="2"/>
             <a:r>
-              <a:rPr lang="en-US" smtClean="0"/>
+              <a:rPr lang="en-US"/>
               <a:t>Third level</a:t>
             </a:r>
           </a:p>
           <a:p>
             <a:pPr lvl="3"/>
             <a:r>
-              <a:rPr lang="en-US" smtClean="0"/>
+              <a:rPr lang="en-US"/>
               <a:t>Fourth level</a:t>
             </a:r>
           </a:p>
           <a:p>
             <a:pPr lvl="4"/>
             <a:r>
-              <a:rPr lang="en-US" smtClean="0"/>
+              <a:rPr lang="en-US"/>
               <a:t>Fifth level</a:t>
             </a:r>
-            <a:endParaRPr lang="en-US"/>
           </a:p>
         </p:txBody>
       </p:sp>
@@ -2360,7 +2378,7 @@
             <a:fld id="{1D8BD707-D9CF-40AE-B4C6-C98DA3205C09}" type="datetimeFigureOut">
               <a:rPr lang="en-US" smtClean="0"/>
               <a:pPr/>
-              <a:t>07/03/16</a:t>
+              <a:t>5/21/18</a:t>
             </a:fld>
             <a:endParaRPr lang="en-US"/>
           </a:p>
@@ -2454,10 +2472,9 @@
           </a:lstStyle>
           <a:p>
             <a:r>
-              <a:rPr lang="en-US" smtClean="0"/>
+              <a:rPr lang="en-US"/>
               <a:t>Click to edit Master title style</a:t>
             </a:r>
-            <a:endParaRPr lang="en-US"/>
           </a:p>
         </p:txBody>
       </p:sp>
@@ -2520,7 +2537,7 @@
           <a:p>
             <a:pPr lvl="0"/>
             <a:r>
-              <a:rPr lang="en-US" smtClean="0"/>
+              <a:rPr lang="en-US"/>
               <a:t>Click to edit Master text styles</a:t>
             </a:r>
           </a:p>
@@ -2576,38 +2593,37 @@
           <a:p>
             <a:pPr lvl="0"/>
             <a:r>
-              <a:rPr lang="en-US" smtClean="0"/>
+              <a:rPr lang="en-US"/>
               <a:t>Click to edit Master text styles</a:t>
             </a:r>
           </a:p>
           <a:p>
             <a:pPr lvl="1"/>
             <a:r>
-              <a:rPr lang="en-US" smtClean="0"/>
+              <a:rPr lang="en-US"/>
               <a:t>Second level</a:t>
             </a:r>
           </a:p>
           <a:p>
             <a:pPr lvl="2"/>
             <a:r>
-              <a:rPr lang="en-US" smtClean="0"/>
+              <a:rPr lang="en-US"/>
               <a:t>Third level</a:t>
             </a:r>
           </a:p>
           <a:p>
             <a:pPr lvl="3"/>
             <a:r>
-              <a:rPr lang="en-US" smtClean="0"/>
+              <a:rPr lang="en-US"/>
               <a:t>Fourth level</a:t>
             </a:r>
           </a:p>
           <a:p>
             <a:pPr lvl="4"/>
             <a:r>
-              <a:rPr lang="en-US" smtClean="0"/>
+              <a:rPr lang="en-US"/>
               <a:t>Fifth level</a:t>
             </a:r>
-            <a:endParaRPr lang="en-US"/>
           </a:p>
         </p:txBody>
       </p:sp>
@@ -2670,7 +2686,7 @@
           <a:p>
             <a:pPr lvl="0"/>
             <a:r>
-              <a:rPr lang="en-US" smtClean="0"/>
+              <a:rPr lang="en-US"/>
               <a:t>Click to edit Master text styles</a:t>
             </a:r>
           </a:p>
@@ -2726,38 +2742,37 @@
           <a:p>
             <a:pPr lvl="0"/>
             <a:r>
-              <a:rPr lang="en-US" smtClean="0"/>
+              <a:rPr lang="en-US"/>
               <a:t>Click to edit Master text styles</a:t>
             </a:r>
           </a:p>
           <a:p>
             <a:pPr lvl="1"/>
             <a:r>
-              <a:rPr lang="en-US" smtClean="0"/>
+              <a:rPr lang="en-US"/>
               <a:t>Second level</a:t>
             </a:r>
           </a:p>
           <a:p>
             <a:pPr lvl="2"/>
             <a:r>
-              <a:rPr lang="en-US" smtClean="0"/>
+              <a:rPr lang="en-US"/>
               <a:t>Third level</a:t>
             </a:r>
           </a:p>
           <a:p>
             <a:pPr lvl="3"/>
             <a:r>
-              <a:rPr lang="en-US" smtClean="0"/>
+              <a:rPr lang="en-US"/>
               <a:t>Fourth level</a:t>
             </a:r>
           </a:p>
           <a:p>
             <a:pPr lvl="4"/>
             <a:r>
-              <a:rPr lang="en-US" smtClean="0"/>
+              <a:rPr lang="en-US"/>
               <a:t>Fifth level</a:t>
             </a:r>
-            <a:endParaRPr lang="en-US"/>
           </a:p>
         </p:txBody>
       </p:sp>
@@ -2779,7 +2794,7 @@
             <a:fld id="{1D8BD707-D9CF-40AE-B4C6-C98DA3205C09}" type="datetimeFigureOut">
               <a:rPr lang="en-US" smtClean="0"/>
               <a:pPr/>
-              <a:t>07/03/16</a:t>
+              <a:t>5/21/18</a:t>
             </a:fld>
             <a:endParaRPr lang="en-US"/>
           </a:p>
@@ -2869,10 +2884,9 @@
           <a:lstStyle/>
           <a:p>
             <a:r>
-              <a:rPr lang="en-US" smtClean="0"/>
+              <a:rPr lang="en-US"/>
               <a:t>Click to edit Master title style</a:t>
             </a:r>
-            <a:endParaRPr lang="en-US"/>
           </a:p>
         </p:txBody>
       </p:sp>
@@ -2894,7 +2908,7 @@
             <a:fld id="{1D8BD707-D9CF-40AE-B4C6-C98DA3205C09}" type="datetimeFigureOut">
               <a:rPr lang="en-US" smtClean="0"/>
               <a:pPr/>
-              <a:t>07/03/16</a:t>
+              <a:t>5/21/18</a:t>
             </a:fld>
             <a:endParaRPr lang="en-US"/>
           </a:p>
@@ -2986,7 +3000,7 @@
             <a:fld id="{1D8BD707-D9CF-40AE-B4C6-C98DA3205C09}" type="datetimeFigureOut">
               <a:rPr lang="en-US" smtClean="0"/>
               <a:pPr/>
-              <a:t>07/03/16</a:t>
+              <a:t>5/21/18</a:t>
             </a:fld>
             <a:endParaRPr lang="en-US"/>
           </a:p>
@@ -3085,10 +3099,9 @@
           </a:lstStyle>
           <a:p>
             <a:r>
-              <a:rPr lang="en-US" smtClean="0"/>
+              <a:rPr lang="en-US"/>
               <a:t>Click to edit Master title style</a:t>
             </a:r>
-            <a:endParaRPr lang="en-US"/>
           </a:p>
         </p:txBody>
       </p:sp>
@@ -3142,38 +3155,37 @@
           <a:p>
             <a:pPr lvl="0"/>
             <a:r>
-              <a:rPr lang="en-US" smtClean="0"/>
+              <a:rPr lang="en-US"/>
               <a:t>Click to edit Master text styles</a:t>
             </a:r>
           </a:p>
           <a:p>
             <a:pPr lvl="1"/>
             <a:r>
-              <a:rPr lang="en-US" smtClean="0"/>
+              <a:rPr lang="en-US"/>
               <a:t>Second level</a:t>
             </a:r>
           </a:p>
           <a:p>
             <a:pPr lvl="2"/>
             <a:r>
-              <a:rPr lang="en-US" smtClean="0"/>
+              <a:rPr lang="en-US"/>
               <a:t>Third level</a:t>
             </a:r>
           </a:p>
           <a:p>
             <a:pPr lvl="3"/>
             <a:r>
-              <a:rPr lang="en-US" smtClean="0"/>
+              <a:rPr lang="en-US"/>
               <a:t>Fourth level</a:t>
             </a:r>
           </a:p>
           <a:p>
             <a:pPr lvl="4"/>
             <a:r>
-              <a:rPr lang="en-US" smtClean="0"/>
+              <a:rPr lang="en-US"/>
               <a:t>Fifth level</a:t>
             </a:r>
-            <a:endParaRPr lang="en-US"/>
           </a:p>
         </p:txBody>
       </p:sp>
@@ -3236,7 +3248,7 @@
           <a:p>
             <a:pPr lvl="0"/>
             <a:r>
-              <a:rPr lang="en-US" smtClean="0"/>
+              <a:rPr lang="en-US"/>
               <a:t>Click to edit Master text styles</a:t>
             </a:r>
           </a:p>
@@ -3260,7 +3272,7 @@
             <a:fld id="{1D8BD707-D9CF-40AE-B4C6-C98DA3205C09}" type="datetimeFigureOut">
               <a:rPr lang="en-US" smtClean="0"/>
               <a:pPr/>
-              <a:t>07/03/16</a:t>
+              <a:t>5/21/18</a:t>
             </a:fld>
             <a:endParaRPr lang="en-US"/>
           </a:p>
@@ -3359,10 +3371,9 @@
           </a:lstStyle>
           <a:p>
             <a:r>
-              <a:rPr lang="en-US" smtClean="0"/>
+              <a:rPr lang="en-US"/>
               <a:t>Click to edit Master title style</a:t>
             </a:r>
-            <a:endParaRPr lang="en-US"/>
           </a:p>
         </p:txBody>
       </p:sp>
@@ -3486,7 +3497,7 @@
           <a:p>
             <a:pPr lvl="0"/>
             <a:r>
-              <a:rPr lang="en-US" smtClean="0"/>
+              <a:rPr lang="en-US"/>
               <a:t>Click to edit Master text styles</a:t>
             </a:r>
           </a:p>
@@ -3510,7 +3521,7 @@
             <a:fld id="{1D8BD707-D9CF-40AE-B4C6-C98DA3205C09}" type="datetimeFigureOut">
               <a:rPr lang="en-US" smtClean="0"/>
               <a:pPr/>
-              <a:t>07/03/16</a:t>
+              <a:t>5/21/18</a:t>
             </a:fld>
             <a:endParaRPr lang="en-US"/>
           </a:p>
@@ -3621,10 +3632,9 @@
           <a:lstStyle/>
           <a:p>
             <a:r>
-              <a:rPr lang="en-US" smtClean="0"/>
+              <a:rPr lang="en-US"/>
               <a:t>Click to edit Master title style</a:t>
             </a:r>
-            <a:endParaRPr lang="en-US"/>
           </a:p>
         </p:txBody>
       </p:sp>
@@ -3655,38 +3665,37 @@
           <a:p>
             <a:pPr lvl="0"/>
             <a:r>
-              <a:rPr lang="en-US" smtClean="0"/>
+              <a:rPr lang="en-US"/>
               <a:t>Click to edit Master text styles</a:t>
             </a:r>
           </a:p>
           <a:p>
             <a:pPr lvl="1"/>
             <a:r>
-              <a:rPr lang="en-US" smtClean="0"/>
+              <a:rPr lang="en-US"/>
               <a:t>Second level</a:t>
             </a:r>
           </a:p>
           <a:p>
             <a:pPr lvl="2"/>
             <a:r>
-              <a:rPr lang="en-US" smtClean="0"/>
+              <a:rPr lang="en-US"/>
               <a:t>Third level</a:t>
             </a:r>
           </a:p>
           <a:p>
             <a:pPr lvl="3"/>
             <a:r>
-              <a:rPr lang="en-US" smtClean="0"/>
+              <a:rPr lang="en-US"/>
               <a:t>Fourth level</a:t>
             </a:r>
           </a:p>
           <a:p>
             <a:pPr lvl="4"/>
             <a:r>
-              <a:rPr lang="en-US" smtClean="0"/>
+              <a:rPr lang="en-US"/>
               <a:t>Fifth level</a:t>
             </a:r>
-            <a:endParaRPr lang="en-US"/>
           </a:p>
         </p:txBody>
       </p:sp>
@@ -3726,7 +3735,7 @@
             <a:fld id="{1D8BD707-D9CF-40AE-B4C6-C98DA3205C09}" type="datetimeFigureOut">
               <a:rPr lang="en-US" smtClean="0"/>
               <a:pPr/>
-              <a:t>07/03/16</a:t>
+              <a:t>5/21/18</a:t>
             </a:fld>
             <a:endParaRPr lang="en-US"/>
           </a:p>
@@ -4120,7 +4129,7 @@
           <a:lstStyle/>
           <a:p>
             <a:r>
-              <a:rPr lang="en-GB" sz="8800" b="1" dirty="0" smtClean="0">
+              <a:rPr lang="en-GB" sz="8800" b="1" dirty="0">
                 <a:solidFill>
                   <a:schemeClr val="bg1"/>
                 </a:solidFill>
@@ -4129,13 +4138,6 @@
               </a:rPr>
               <a:t>Puzzle</a:t>
             </a:r>
-            <a:endParaRPr lang="en-GB" sz="8800" b="1" dirty="0">
-              <a:solidFill>
-                <a:schemeClr val="bg1"/>
-              </a:solidFill>
-              <a:latin typeface="Courier New" pitchFamily="49" charset="0"/>
-              <a:cs typeface="Courier New" pitchFamily="49" charset="0"/>
-            </a:endParaRPr>
           </a:p>
         </p:txBody>
       </p:sp>
@@ -4162,7 +4164,7 @@
           <a:lstStyle/>
           <a:p>
             <a:r>
-              <a:rPr lang="en-GB" sz="3600" b="1" dirty="0" smtClean="0">
+              <a:rPr lang="en-GB" sz="3600" b="1" dirty="0">
                 <a:solidFill>
                   <a:schemeClr val="bg1"/>
                 </a:solidFill>
@@ -4171,13 +4173,6 @@
               </a:rPr>
               <a:t>“Who in the world am I? Ah, that’s the great puzzle.” ~ Lewis Carroll</a:t>
             </a:r>
-            <a:endParaRPr lang="en-GB" sz="3600" b="1" dirty="0">
-              <a:solidFill>
-                <a:schemeClr val="bg1"/>
-              </a:solidFill>
-              <a:latin typeface="Courier New" pitchFamily="49" charset="0"/>
-              <a:cs typeface="Courier New" pitchFamily="49" charset="0"/>
-            </a:endParaRPr>
           </a:p>
         </p:txBody>
       </p:sp>
@@ -4191,13 +4186,6 @@
   <p:clrMapOvr>
     <a:masterClrMapping/>
   </p:clrMapOvr>
-  <p:timing>
-    <p:tnLst>
-      <p:par>
-        <p:cTn xmlns:p14="http://schemas.microsoft.com/office/powerpoint/2010/main" id="1" dur="indefinite" restart="never" nodeType="tmRoot"/>
-      </p:par>
-    </p:tnLst>
-  </p:timing>
 </p:sld>
 </file>
 
@@ -4241,7 +4229,7 @@
           <a:lstStyle/>
           <a:p>
             <a:r>
-              <a:rPr lang="en-GB" sz="6000" b="1" dirty="0" smtClean="0">
+              <a:rPr lang="en-GB" sz="6000" b="1" dirty="0">
                 <a:solidFill>
                   <a:schemeClr val="bg1"/>
                 </a:solidFill>
@@ -4250,13 +4238,6 @@
               </a:rPr>
               <a:t>Mission…</a:t>
             </a:r>
-            <a:endParaRPr lang="en-GB" sz="6000" b="1" dirty="0">
-              <a:solidFill>
-                <a:schemeClr val="bg1"/>
-              </a:solidFill>
-              <a:latin typeface="Courier New" pitchFamily="49" charset="0"/>
-              <a:cs typeface="Courier New" pitchFamily="49" charset="0"/>
-            </a:endParaRPr>
           </a:p>
         </p:txBody>
       </p:sp>
@@ -4285,16 +4266,6 @@
             <a:pPr marL="0" indent="0">
               <a:buNone/>
             </a:pPr>
-            <a:r>
-              <a:rPr lang="en-GB" sz="3500" dirty="0" smtClean="0">
-                <a:solidFill>
-                  <a:schemeClr val="bg1"/>
-                </a:solidFill>
-                <a:latin typeface="Courier New" pitchFamily="49" charset="0"/>
-                <a:cs typeface="Courier New" pitchFamily="49" charset="0"/>
-              </a:rPr>
-              <a:t>“Using </a:t>
-            </a:r>
             <a:r>
               <a:rPr lang="en-GB" sz="3500" dirty="0">
                 <a:solidFill>
@@ -4303,47 +4274,7 @@
                 <a:latin typeface="Courier New" pitchFamily="49" charset="0"/>
                 <a:cs typeface="Courier New" pitchFamily="49" charset="0"/>
               </a:rPr>
-              <a:t>the recognition gained </a:t>
-            </a:r>
-            <a:r>
-              <a:rPr lang="en-GB" sz="3500" dirty="0" smtClean="0">
-                <a:solidFill>
-                  <a:schemeClr val="bg1"/>
-                </a:solidFill>
-                <a:latin typeface="Courier New" pitchFamily="49" charset="0"/>
-                <a:cs typeface="Courier New" pitchFamily="49" charset="0"/>
-              </a:rPr>
-              <a:t>build </a:t>
-            </a:r>
-            <a:r>
-              <a:rPr lang="en-GB" sz="3500" dirty="0">
-                <a:solidFill>
-                  <a:schemeClr val="bg1"/>
-                </a:solidFill>
-                <a:latin typeface="Courier New" pitchFamily="49" charset="0"/>
-                <a:cs typeface="Courier New" pitchFamily="49" charset="0"/>
-              </a:rPr>
-              <a:t>a testable map of </a:t>
-            </a:r>
-            <a:r>
-              <a:rPr lang="en-GB" sz="3500" dirty="0" smtClean="0">
-                <a:solidFill>
-                  <a:schemeClr val="bg1"/>
-                </a:solidFill>
-                <a:latin typeface="Courier New" pitchFamily="49" charset="0"/>
-                <a:cs typeface="Courier New" pitchFamily="49" charset="0"/>
-              </a:rPr>
-              <a:t>a high level architecture </a:t>
-            </a:r>
-            <a:r>
-              <a:rPr lang="en-GB" sz="3500" dirty="0">
-                <a:solidFill>
-                  <a:schemeClr val="bg1"/>
-                </a:solidFill>
-                <a:latin typeface="Courier New" pitchFamily="49" charset="0"/>
-                <a:cs typeface="Courier New" pitchFamily="49" charset="0"/>
-              </a:rPr>
-              <a:t>from evidence and experimentation”</a:t>
+              <a:t>“Using the recognition gained build a testable map of a high level architecture from evidence and experimentation”</a:t>
             </a:r>
           </a:p>
           <a:p>
@@ -4409,13 +4340,6 @@
       </p:transition>
     </mc:Fallback>
   </mc:AlternateContent>
-  <p:timing>
-    <p:tnLst>
-      <p:par>
-        <p:cTn xmlns:p14="http://schemas.microsoft.com/office/powerpoint/2010/main" id="1" dur="indefinite" restart="never" nodeType="tmRoot"/>
-      </p:par>
-    </p:tnLst>
-  </p:timing>
 </p:sld>
 </file>
 
@@ -4459,7 +4383,7 @@
           <a:lstStyle/>
           <a:p>
             <a:r>
-              <a:rPr lang="en-GB" sz="6000" b="1" dirty="0" smtClean="0">
+              <a:rPr lang="en-GB" sz="6000" b="1" dirty="0">
                 <a:solidFill>
                   <a:schemeClr val="bg1"/>
                 </a:solidFill>
@@ -4468,13 +4392,6 @@
               </a:rPr>
               <a:t>Objectives…</a:t>
             </a:r>
-            <a:endParaRPr lang="en-GB" sz="6000" b="1" dirty="0">
-              <a:solidFill>
-                <a:schemeClr val="bg1"/>
-              </a:solidFill>
-              <a:latin typeface="Courier New" pitchFamily="49" charset="0"/>
-              <a:cs typeface="Courier New" pitchFamily="49" charset="0"/>
-            </a:endParaRPr>
           </a:p>
         </p:txBody>
       </p:sp>
@@ -4504,7 +4421,7 @@
               <a:buNone/>
             </a:pPr>
             <a:r>
-              <a:rPr lang="en-GB" sz="4400" dirty="0" smtClean="0">
+              <a:rPr lang="en-GB" sz="4400" dirty="0">
                 <a:solidFill>
                   <a:schemeClr val="bg1"/>
                 </a:solidFill>
@@ -4513,13 +4430,6 @@
               </a:rPr>
               <a:t>Learning Objectives:</a:t>
             </a:r>
-            <a:endParaRPr lang="en-GB" sz="4400" dirty="0">
-              <a:solidFill>
-                <a:schemeClr val="bg1"/>
-              </a:solidFill>
-              <a:latin typeface="Courier New" pitchFamily="49" charset="0"/>
-              <a:cs typeface="Courier New" pitchFamily="49" charset="0"/>
-            </a:endParaRPr>
           </a:p>
           <a:p>
             <a:pPr>
@@ -4543,16 +4453,6 @@
               <a:buChar char="•"/>
             </a:pPr>
             <a:r>
-              <a:rPr lang="en-GB" sz="4400" dirty="0" smtClean="0">
-                <a:solidFill>
-                  <a:schemeClr val="bg1"/>
-                </a:solidFill>
-                <a:latin typeface="Courier New" pitchFamily="49" charset="0"/>
-                <a:cs typeface="Courier New" pitchFamily="49" charset="0"/>
-              </a:rPr>
-              <a:t>Diagram </a:t>
-            </a:r>
-            <a:r>
               <a:rPr lang="en-GB" sz="4400" dirty="0">
                 <a:solidFill>
                   <a:schemeClr val="bg1"/>
@@ -4560,7 +4460,7 @@
                 <a:latin typeface="Courier New" pitchFamily="49" charset="0"/>
                 <a:cs typeface="Courier New" pitchFamily="49" charset="0"/>
               </a:rPr>
-              <a:t>the architecture using common architectural notations and visual dictionary from the first exercise</a:t>
+              <a:t>Diagram the architecture using common architectural notations and visual dictionary from the first exercise</a:t>
             </a:r>
           </a:p>
           <a:p>
@@ -4568,16 +4468,6 @@
               <a:buFontTx/>
               <a:buChar char="•"/>
             </a:pPr>
-            <a:r>
-              <a:rPr lang="en-GB" sz="4400" dirty="0" smtClean="0">
-                <a:solidFill>
-                  <a:schemeClr val="bg1"/>
-                </a:solidFill>
-                <a:latin typeface="Courier New" pitchFamily="49" charset="0"/>
-                <a:cs typeface="Courier New" pitchFamily="49" charset="0"/>
-              </a:rPr>
-              <a:t>Assess </a:t>
-            </a:r>
             <a:r>
               <a:rPr lang="en-GB" sz="4400" dirty="0">
                 <a:solidFill>
@@ -4586,45 +4476,8 @@
                 <a:latin typeface="Courier New" pitchFamily="49" charset="0"/>
                 <a:cs typeface="Courier New" pitchFamily="49" charset="0"/>
               </a:rPr>
-              <a:t>architectural evidence to </a:t>
-            </a:r>
-            <a:r>
-              <a:rPr lang="en-GB" sz="4400" dirty="0" smtClean="0">
-                <a:solidFill>
-                  <a:schemeClr val="bg1"/>
-                </a:solidFill>
-                <a:latin typeface="Courier New" pitchFamily="49" charset="0"/>
-                <a:cs typeface="Courier New" pitchFamily="49" charset="0"/>
-              </a:rPr>
-              <a:t>determine reliability </a:t>
-            </a:r>
-            <a:r>
-              <a:rPr lang="en-GB" sz="4400" dirty="0">
-                <a:solidFill>
-                  <a:schemeClr val="bg1"/>
-                </a:solidFill>
-                <a:latin typeface="Courier New" pitchFamily="49" charset="0"/>
-                <a:cs typeface="Courier New" pitchFamily="49" charset="0"/>
-              </a:rPr>
-              <a:t>of the </a:t>
-            </a:r>
-            <a:r>
-              <a:rPr lang="en-GB" sz="4400" dirty="0" smtClean="0">
-                <a:solidFill>
-                  <a:schemeClr val="bg1"/>
-                </a:solidFill>
-                <a:latin typeface="Courier New" pitchFamily="49" charset="0"/>
-                <a:cs typeface="Courier New" pitchFamily="49" charset="0"/>
-              </a:rPr>
-              <a:t>available oracles</a:t>
-            </a:r>
-            <a:endParaRPr lang="en-GB" sz="4400" dirty="0">
-              <a:solidFill>
-                <a:schemeClr val="bg1"/>
-              </a:solidFill>
-              <a:latin typeface="Courier New" pitchFamily="49" charset="0"/>
-              <a:cs typeface="Courier New" pitchFamily="49" charset="0"/>
-            </a:endParaRPr>
+              <a:t>Assess architectural evidence to determine reliability of the available oracles</a:t>
+            </a:r>
           </a:p>
         </p:txBody>
       </p:sp>
@@ -4677,7 +4530,445 @@
   <p:timing>
     <p:tnLst>
       <p:par>
-        <p:cTn xmlns:p14="http://schemas.microsoft.com/office/powerpoint/2010/main" id="1" dur="indefinite" restart="never" nodeType="tmRoot">
+        <p:cTn id="1" dur="indefinite" restart="never" nodeType="tmRoot">
+          <p:childTnLst>
+            <p:seq concurrent="1" nextAc="seek">
+              <p:cTn id="2" dur="indefinite" nodeType="mainSeq">
+                <p:childTnLst>
+                  <p:par>
+                    <p:cTn id="3" fill="hold">
+                      <p:stCondLst>
+                        <p:cond delay="indefinite"/>
+                      </p:stCondLst>
+                      <p:childTnLst>
+                        <p:par>
+                          <p:cTn id="4" fill="hold">
+                            <p:stCondLst>
+                              <p:cond delay="0"/>
+                            </p:stCondLst>
+                            <p:childTnLst>
+                              <p:par>
+                                <p:cTn id="5" presetID="1" presetClass="entr" presetSubtype="0" fill="hold" nodeType="clickEffect">
+                                  <p:stCondLst>
+                                    <p:cond delay="0"/>
+                                  </p:stCondLst>
+                                  <p:childTnLst>
+                                    <p:set>
+                                      <p:cBhvr>
+                                        <p:cTn id="6" dur="1" fill="hold">
+                                          <p:stCondLst>
+                                            <p:cond delay="0"/>
+                                          </p:stCondLst>
+                                        </p:cTn>
+                                        <p:tgtEl>
+                                          <p:spTgt spid="3">
+                                            <p:txEl>
+                                              <p:pRg st="2" end="2"/>
+                                            </p:txEl>
+                                          </p:spTgt>
+                                        </p:tgtEl>
+                                        <p:attrNameLst>
+                                          <p:attrName>style.visibility</p:attrName>
+                                        </p:attrNameLst>
+                                      </p:cBhvr>
+                                      <p:to>
+                                        <p:strVal val="visible"/>
+                                      </p:to>
+                                    </p:set>
+                                  </p:childTnLst>
+                                </p:cTn>
+                              </p:par>
+                            </p:childTnLst>
+                          </p:cTn>
+                        </p:par>
+                      </p:childTnLst>
+                    </p:cTn>
+                  </p:par>
+                  <p:par>
+                    <p:cTn id="7" fill="hold">
+                      <p:stCondLst>
+                        <p:cond delay="indefinite"/>
+                      </p:stCondLst>
+                      <p:childTnLst>
+                        <p:par>
+                          <p:cTn id="8" fill="hold">
+                            <p:stCondLst>
+                              <p:cond delay="0"/>
+                            </p:stCondLst>
+                            <p:childTnLst>
+                              <p:par>
+                                <p:cTn id="9" presetID="1" presetClass="entr" presetSubtype="0" fill="hold" nodeType="clickEffect">
+                                  <p:stCondLst>
+                                    <p:cond delay="0"/>
+                                  </p:stCondLst>
+                                  <p:childTnLst>
+                                    <p:set>
+                                      <p:cBhvr>
+                                        <p:cTn id="10" dur="1" fill="hold">
+                                          <p:stCondLst>
+                                            <p:cond delay="0"/>
+                                          </p:stCondLst>
+                                        </p:cTn>
+                                        <p:tgtEl>
+                                          <p:spTgt spid="3">
+                                            <p:txEl>
+                                              <p:pRg st="3" end="3"/>
+                                            </p:txEl>
+                                          </p:spTgt>
+                                        </p:tgtEl>
+                                        <p:attrNameLst>
+                                          <p:attrName>style.visibility</p:attrName>
+                                        </p:attrNameLst>
+                                      </p:cBhvr>
+                                      <p:to>
+                                        <p:strVal val="visible"/>
+                                      </p:to>
+                                    </p:set>
+                                  </p:childTnLst>
+                                </p:cTn>
+                              </p:par>
+                            </p:childTnLst>
+                          </p:cTn>
+                        </p:par>
+                      </p:childTnLst>
+                    </p:cTn>
+                  </p:par>
+                </p:childTnLst>
+              </p:cTn>
+              <p:prevCondLst>
+                <p:cond evt="onPrev" delay="0">
+                  <p:tgtEl>
+                    <p:sldTgt/>
+                  </p:tgtEl>
+                </p:cond>
+              </p:prevCondLst>
+              <p:nextCondLst>
+                <p:cond evt="onNext" delay="0">
+                  <p:tgtEl>
+                    <p:sldTgt/>
+                  </p:tgtEl>
+                </p:cond>
+              </p:nextCondLst>
+            </p:seq>
+          </p:childTnLst>
+        </p:cTn>
+      </p:par>
+    </p:tnLst>
+  </p:timing>
+</p:sld>
+</file>
+
+<file path=ppt/slides/slide4.xml><?xml version="1.0" encoding="utf-8"?>
+<p:sld xmlns:a="http://schemas.openxmlformats.org/drawingml/2006/main" xmlns:r="http://schemas.openxmlformats.org/officeDocument/2006/relationships" xmlns:p="http://schemas.openxmlformats.org/presentationml/2006/main">
+  <p:cSld>
+    <p:spTree>
+      <p:nvGrpSpPr>
+        <p:cNvPr id="1" name=""/>
+        <p:cNvGrpSpPr/>
+        <p:nvPr/>
+      </p:nvGrpSpPr>
+      <p:grpSpPr>
+        <a:xfrm>
+          <a:off x="0" y="0"/>
+          <a:ext cx="0" cy="0"/>
+          <a:chOff x="0" y="0"/>
+          <a:chExt cx="0" cy="0"/>
+        </a:xfrm>
+      </p:grpSpPr>
+      <p:sp>
+        <p:nvSpPr>
+          <p:cNvPr id="2" name="Title 1"/>
+          <p:cNvSpPr>
+            <a:spLocks noGrp="1"/>
+          </p:cNvSpPr>
+          <p:nvPr>
+            <p:ph type="title"/>
+          </p:nvPr>
+        </p:nvSpPr>
+        <p:spPr>
+          <a:xfrm>
+            <a:off x="304800" y="228600"/>
+            <a:ext cx="8534400" cy="1143000"/>
+          </a:xfrm>
+        </p:spPr>
+        <p:txBody>
+          <a:bodyPr>
+            <a:normAutofit/>
+          </a:bodyPr>
+          <a:lstStyle/>
+          <a:p>
+            <a:r>
+              <a:rPr lang="en-GB" sz="5400" b="1" dirty="0">
+                <a:solidFill>
+                  <a:schemeClr val="bg1"/>
+                </a:solidFill>
+                <a:latin typeface="Courier New" pitchFamily="49" charset="0"/>
+                <a:cs typeface="Courier New" pitchFamily="49" charset="0"/>
+              </a:rPr>
+              <a:t>Oracle Problem!</a:t>
+            </a:r>
+          </a:p>
+        </p:txBody>
+      </p:sp>
+      <p:pic>
+        <p:nvPicPr>
+          <p:cNvPr id="6" name="Content Placeholder 5"/>
+          <p:cNvPicPr>
+            <a:picLocks noGrp="1" noChangeAspect="1"/>
+          </p:cNvPicPr>
+          <p:nvPr>
+            <p:ph idx="1"/>
+          </p:nvPr>
+        </p:nvPicPr>
+        <p:blipFill>
+          <a:blip r:embed="rId3" cstate="screen">
+            <a:extLst>
+              <a:ext uri="{28A0092B-C50C-407E-A947-70E740481C1C}">
+                <a14:useLocalDpi xmlns:a14="http://schemas.microsoft.com/office/drawing/2010/main"/>
+              </a:ext>
+            </a:extLst>
+          </a:blip>
+          <a:srcRect l="-61325" r="-61325"/>
+          <a:stretch>
+            <a:fillRect/>
+          </a:stretch>
+        </p:blipFill>
+        <p:spPr/>
+      </p:pic>
+    </p:spTree>
+    <p:extLst>
+      <p:ext uri="{BB962C8B-B14F-4D97-AF65-F5344CB8AC3E}">
+        <p14:creationId xmlns:p14="http://schemas.microsoft.com/office/powerpoint/2010/main" val="3013913170"/>
+      </p:ext>
+    </p:extLst>
+  </p:cSld>
+  <p:clrMapOvr>
+    <a:masterClrMapping/>
+  </p:clrMapOvr>
+  <mc:AlternateContent xmlns:mc="http://schemas.openxmlformats.org/markup-compatibility/2006" xmlns:p14="http://schemas.microsoft.com/office/powerpoint/2010/main">
+    <mc:Choice Requires="p14">
+      <p:transition p14:dur="100">
+        <p:cut/>
+      </p:transition>
+    </mc:Choice>
+    <mc:Fallback xmlns="">
+      <p:transition xmlns:p14="http://schemas.microsoft.com/office/powerpoint/2010/main">
+        <p:cut/>
+      </p:transition>
+    </mc:Fallback>
+  </mc:AlternateContent>
+</p:sld>
+</file>
+
+<file path=ppt/slides/slide5.xml><?xml version="1.0" encoding="utf-8"?>
+<p:sld xmlns:a="http://schemas.openxmlformats.org/drawingml/2006/main" xmlns:r="http://schemas.openxmlformats.org/officeDocument/2006/relationships" xmlns:p="http://schemas.openxmlformats.org/presentationml/2006/main">
+  <p:cSld>
+    <p:spTree>
+      <p:nvGrpSpPr>
+        <p:cNvPr id="1" name=""/>
+        <p:cNvGrpSpPr/>
+        <p:nvPr/>
+      </p:nvGrpSpPr>
+      <p:grpSpPr>
+        <a:xfrm>
+          <a:off x="0" y="0"/>
+          <a:ext cx="0" cy="0"/>
+          <a:chOff x="0" y="0"/>
+          <a:chExt cx="0" cy="0"/>
+        </a:xfrm>
+      </p:grpSpPr>
+      <p:sp>
+        <p:nvSpPr>
+          <p:cNvPr id="2" name="Title 1"/>
+          <p:cNvSpPr>
+            <a:spLocks noGrp="1"/>
+          </p:cNvSpPr>
+          <p:nvPr>
+            <p:ph type="title"/>
+          </p:nvPr>
+        </p:nvSpPr>
+        <p:spPr>
+          <a:xfrm>
+            <a:off x="304800" y="228600"/>
+            <a:ext cx="8534400" cy="1143000"/>
+          </a:xfrm>
+        </p:spPr>
+        <p:txBody>
+          <a:bodyPr>
+            <a:normAutofit/>
+          </a:bodyPr>
+          <a:lstStyle/>
+          <a:p>
+            <a:r>
+              <a:rPr lang="en-GB" sz="5400" b="1" dirty="0">
+                <a:solidFill>
+                  <a:schemeClr val="bg1"/>
+                </a:solidFill>
+                <a:latin typeface="Courier New" pitchFamily="49" charset="0"/>
+                <a:cs typeface="Courier New" pitchFamily="49" charset="0"/>
+              </a:rPr>
+              <a:t>Oracles!</a:t>
+            </a:r>
+          </a:p>
+        </p:txBody>
+      </p:sp>
+      <p:sp>
+        <p:nvSpPr>
+          <p:cNvPr id="3" name="Content Placeholder 2"/>
+          <p:cNvSpPr>
+            <a:spLocks noGrp="1"/>
+          </p:cNvSpPr>
+          <p:nvPr>
+            <p:ph idx="1"/>
+          </p:nvPr>
+        </p:nvSpPr>
+        <p:spPr>
+          <a:xfrm>
+            <a:off x="304800" y="1524000"/>
+            <a:ext cx="4114800" cy="4953000"/>
+          </a:xfrm>
+        </p:spPr>
+        <p:txBody>
+          <a:bodyPr>
+            <a:normAutofit fontScale="70000" lnSpcReduction="20000"/>
+          </a:bodyPr>
+          <a:lstStyle/>
+          <a:p>
+            <a:r>
+              <a:rPr lang="en-GB" sz="4400" dirty="0">
+                <a:solidFill>
+                  <a:schemeClr val="bg1"/>
+                </a:solidFill>
+                <a:latin typeface="Courier New" pitchFamily="49" charset="0"/>
+                <a:cs typeface="Courier New" pitchFamily="49" charset="0"/>
+              </a:rPr>
+              <a:t>Symbols</a:t>
+            </a:r>
+          </a:p>
+          <a:p>
+            <a:r>
+              <a:rPr lang="en-GB" sz="4400" dirty="0">
+                <a:solidFill>
+                  <a:schemeClr val="bg1"/>
+                </a:solidFill>
+                <a:latin typeface="Courier New" pitchFamily="49" charset="0"/>
+                <a:cs typeface="Courier New" pitchFamily="49" charset="0"/>
+              </a:rPr>
+              <a:t>Anecdotes</a:t>
+            </a:r>
+          </a:p>
+          <a:p>
+            <a:r>
+              <a:rPr lang="en-GB" sz="4400" dirty="0">
+                <a:solidFill>
+                  <a:schemeClr val="bg1"/>
+                </a:solidFill>
+                <a:latin typeface="Courier New" pitchFamily="49" charset="0"/>
+                <a:cs typeface="Courier New" pitchFamily="49" charset="0"/>
+              </a:rPr>
+              <a:t>Bugs</a:t>
+            </a:r>
+          </a:p>
+          <a:p>
+            <a:r>
+              <a:rPr lang="en-GB" sz="4400" dirty="0">
+                <a:solidFill>
+                  <a:schemeClr val="bg1"/>
+                </a:solidFill>
+                <a:latin typeface="Courier New" pitchFamily="49" charset="0"/>
+                <a:cs typeface="Courier New" pitchFamily="49" charset="0"/>
+              </a:rPr>
+              <a:t>Original Diagrams</a:t>
+            </a:r>
+          </a:p>
+          <a:p>
+            <a:r>
+              <a:rPr lang="en-GB" sz="4400" dirty="0">
+                <a:solidFill>
+                  <a:schemeClr val="bg1"/>
+                </a:solidFill>
+                <a:latin typeface="Courier New" pitchFamily="49" charset="0"/>
+                <a:cs typeface="Courier New" pitchFamily="49" charset="0"/>
+              </a:rPr>
+              <a:t>Performance Statistics</a:t>
+            </a:r>
+          </a:p>
+          <a:p>
+            <a:r>
+              <a:rPr lang="en-GB" sz="4400" dirty="0">
+                <a:solidFill>
+                  <a:schemeClr val="bg1"/>
+                </a:solidFill>
+                <a:latin typeface="Courier New" pitchFamily="49" charset="0"/>
+                <a:cs typeface="Courier New" pitchFamily="49" charset="0"/>
+              </a:rPr>
+              <a:t>Some are useful</a:t>
+            </a:r>
+          </a:p>
+          <a:p>
+            <a:r>
+              <a:rPr lang="en-GB" sz="4400" dirty="0">
+                <a:solidFill>
+                  <a:schemeClr val="bg1"/>
+                </a:solidFill>
+                <a:latin typeface="Courier New" pitchFamily="49" charset="0"/>
+                <a:cs typeface="Courier New" pitchFamily="49" charset="0"/>
+              </a:rPr>
+              <a:t>Some contradict each other</a:t>
+            </a:r>
+          </a:p>
+        </p:txBody>
+      </p:sp>
+      <p:pic>
+        <p:nvPicPr>
+          <p:cNvPr id="5" name="Picture 4"/>
+          <p:cNvPicPr>
+            <a:picLocks noChangeAspect="1"/>
+          </p:cNvPicPr>
+          <p:nvPr/>
+        </p:nvPicPr>
+        <p:blipFill>
+          <a:blip r:embed="rId3"/>
+          <a:stretch>
+            <a:fillRect/>
+          </a:stretch>
+        </p:blipFill>
+        <p:spPr>
+          <a:xfrm>
+            <a:off x="4953000" y="1567542"/>
+            <a:ext cx="3759200" cy="4833257"/>
+          </a:xfrm>
+          <a:prstGeom prst="rect">
+            <a:avLst/>
+          </a:prstGeom>
+        </p:spPr>
+      </p:pic>
+    </p:spTree>
+    <p:extLst>
+      <p:ext uri="{BB962C8B-B14F-4D97-AF65-F5344CB8AC3E}">
+        <p14:creationId xmlns:p14="http://schemas.microsoft.com/office/powerpoint/2010/main" val="4059101004"/>
+      </p:ext>
+    </p:extLst>
+  </p:cSld>
+  <p:clrMapOvr>
+    <a:masterClrMapping/>
+  </p:clrMapOvr>
+  <mc:AlternateContent xmlns:mc="http://schemas.openxmlformats.org/markup-compatibility/2006" xmlns:p14="http://schemas.microsoft.com/office/powerpoint/2010/main">
+    <mc:Choice Requires="p14">
+      <p:transition p14:dur="100">
+        <p:cut/>
+      </p:transition>
+    </mc:Choice>
+    <mc:Fallback xmlns="">
+      <p:transition xmlns:p14="http://schemas.microsoft.com/office/powerpoint/2010/main">
+        <p:cut/>
+      </p:transition>
+    </mc:Fallback>
+  </mc:AlternateContent>
+  <p:timing>
+    <p:tnLst>
+      <p:par>
+        <p:cTn id="1" dur="indefinite" restart="never" nodeType="tmRoot">
           <p:childTnLst>
             <p:seq concurrent="1" nextAc="seek">
               <p:cTn id="2" dur="indefinite" nodeType="mainSeq">
@@ -4829,518 +5120,6 @@
                       </p:childTnLst>
                     </p:cTn>
                   </p:par>
-                </p:childTnLst>
-              </p:cTn>
-              <p:prevCondLst>
-                <p:cond evt="onPrev" delay="0">
-                  <p:tgtEl>
-                    <p:sldTgt/>
-                  </p:tgtEl>
-                </p:cond>
-              </p:prevCondLst>
-              <p:nextCondLst>
-                <p:cond evt="onNext" delay="0">
-                  <p:tgtEl>
-                    <p:sldTgt/>
-                  </p:tgtEl>
-                </p:cond>
-              </p:nextCondLst>
-            </p:seq>
-          </p:childTnLst>
-        </p:cTn>
-      </p:par>
-    </p:tnLst>
-  </p:timing>
-</p:sld>
-</file>
-
-<file path=ppt/slides/slide4.xml><?xml version="1.0" encoding="utf-8"?>
-<p:sld xmlns:a="http://schemas.openxmlformats.org/drawingml/2006/main" xmlns:r="http://schemas.openxmlformats.org/officeDocument/2006/relationships" xmlns:p="http://schemas.openxmlformats.org/presentationml/2006/main">
-  <p:cSld>
-    <p:spTree>
-      <p:nvGrpSpPr>
-        <p:cNvPr id="1" name=""/>
-        <p:cNvGrpSpPr/>
-        <p:nvPr/>
-      </p:nvGrpSpPr>
-      <p:grpSpPr>
-        <a:xfrm>
-          <a:off x="0" y="0"/>
-          <a:ext cx="0" cy="0"/>
-          <a:chOff x="0" y="0"/>
-          <a:chExt cx="0" cy="0"/>
-        </a:xfrm>
-      </p:grpSpPr>
-      <p:sp>
-        <p:nvSpPr>
-          <p:cNvPr id="2" name="Title 1"/>
-          <p:cNvSpPr>
-            <a:spLocks noGrp="1"/>
-          </p:cNvSpPr>
-          <p:nvPr>
-            <p:ph type="title"/>
-          </p:nvPr>
-        </p:nvSpPr>
-        <p:spPr>
-          <a:xfrm>
-            <a:off x="304800" y="228600"/>
-            <a:ext cx="8534400" cy="1143000"/>
-          </a:xfrm>
-        </p:spPr>
-        <p:txBody>
-          <a:bodyPr>
-            <a:normAutofit/>
-          </a:bodyPr>
-          <a:lstStyle/>
-          <a:p>
-            <a:r>
-              <a:rPr lang="en-GB" sz="5400" b="1" dirty="0" smtClean="0">
-                <a:solidFill>
-                  <a:schemeClr val="bg1"/>
-                </a:solidFill>
-                <a:latin typeface="Courier New" pitchFamily="49" charset="0"/>
-                <a:cs typeface="Courier New" pitchFamily="49" charset="0"/>
-              </a:rPr>
-              <a:t>Oracle Problem!</a:t>
-            </a:r>
-            <a:endParaRPr lang="en-GB" sz="5400" b="1" dirty="0">
-              <a:solidFill>
-                <a:schemeClr val="bg1"/>
-              </a:solidFill>
-              <a:latin typeface="Courier New" pitchFamily="49" charset="0"/>
-              <a:cs typeface="Courier New" pitchFamily="49" charset="0"/>
-            </a:endParaRPr>
-          </a:p>
-        </p:txBody>
-      </p:sp>
-      <p:pic>
-        <p:nvPicPr>
-          <p:cNvPr id="6" name="Content Placeholder 5"/>
-          <p:cNvPicPr>
-            <a:picLocks noGrp="1" noChangeAspect="1"/>
-          </p:cNvPicPr>
-          <p:nvPr>
-            <p:ph idx="1"/>
-          </p:nvPr>
-        </p:nvPicPr>
-        <p:blipFill>
-          <a:blip r:embed="rId3"/>
-          <a:srcRect l="-61325" r="-61325"/>
-          <a:stretch>
-            <a:fillRect/>
-          </a:stretch>
-        </p:blipFill>
-        <p:spPr/>
-      </p:pic>
-    </p:spTree>
-    <p:extLst>
-      <p:ext uri="{BB962C8B-B14F-4D97-AF65-F5344CB8AC3E}">
-        <p14:creationId xmlns:p14="http://schemas.microsoft.com/office/powerpoint/2010/main" val="3013913170"/>
-      </p:ext>
-    </p:extLst>
-  </p:cSld>
-  <p:clrMapOvr>
-    <a:masterClrMapping/>
-  </p:clrMapOvr>
-  <mc:AlternateContent xmlns:mc="http://schemas.openxmlformats.org/markup-compatibility/2006" xmlns:p14="http://schemas.microsoft.com/office/powerpoint/2010/main">
-    <mc:Choice Requires="p14">
-      <p:transition p14:dur="100">
-        <p:cut/>
-      </p:transition>
-    </mc:Choice>
-    <mc:Fallback xmlns="">
-      <p:transition xmlns:p14="http://schemas.microsoft.com/office/powerpoint/2010/main">
-        <p:cut/>
-      </p:transition>
-    </mc:Fallback>
-  </mc:AlternateContent>
-  <p:timing>
-    <p:tnLst>
-      <p:par>
-        <p:cTn xmlns:p14="http://schemas.microsoft.com/office/powerpoint/2010/main" id="1" dur="indefinite" restart="never" nodeType="tmRoot"/>
-      </p:par>
-    </p:tnLst>
-  </p:timing>
-</p:sld>
-</file>
-
-<file path=ppt/slides/slide5.xml><?xml version="1.0" encoding="utf-8"?>
-<p:sld xmlns:a="http://schemas.openxmlformats.org/drawingml/2006/main" xmlns:r="http://schemas.openxmlformats.org/officeDocument/2006/relationships" xmlns:p="http://schemas.openxmlformats.org/presentationml/2006/main">
-  <p:cSld>
-    <p:spTree>
-      <p:nvGrpSpPr>
-        <p:cNvPr id="1" name=""/>
-        <p:cNvGrpSpPr/>
-        <p:nvPr/>
-      </p:nvGrpSpPr>
-      <p:grpSpPr>
-        <a:xfrm>
-          <a:off x="0" y="0"/>
-          <a:ext cx="0" cy="0"/>
-          <a:chOff x="0" y="0"/>
-          <a:chExt cx="0" cy="0"/>
-        </a:xfrm>
-      </p:grpSpPr>
-      <p:sp>
-        <p:nvSpPr>
-          <p:cNvPr id="2" name="Title 1"/>
-          <p:cNvSpPr>
-            <a:spLocks noGrp="1"/>
-          </p:cNvSpPr>
-          <p:nvPr>
-            <p:ph type="title"/>
-          </p:nvPr>
-        </p:nvSpPr>
-        <p:spPr>
-          <a:xfrm>
-            <a:off x="304800" y="304800"/>
-            <a:ext cx="8534400" cy="838200"/>
-          </a:xfrm>
-        </p:spPr>
-        <p:txBody>
-          <a:bodyPr>
-            <a:normAutofit fontScale="90000"/>
-          </a:bodyPr>
-          <a:lstStyle/>
-          <a:p>
-            <a:r>
-              <a:rPr lang="en-GB" sz="5400" b="1" dirty="0" smtClean="0">
-                <a:solidFill>
-                  <a:schemeClr val="bg1"/>
-                </a:solidFill>
-                <a:latin typeface="Courier New" pitchFamily="49" charset="0"/>
-                <a:cs typeface="Courier New" pitchFamily="49" charset="0"/>
-              </a:rPr>
-              <a:t>Exercise…</a:t>
-            </a:r>
-            <a:endParaRPr lang="en-GB" sz="5400" b="1" dirty="0">
-              <a:solidFill>
-                <a:schemeClr val="bg1"/>
-              </a:solidFill>
-              <a:latin typeface="Courier New" pitchFamily="49" charset="0"/>
-              <a:cs typeface="Courier New" pitchFamily="49" charset="0"/>
-            </a:endParaRPr>
-          </a:p>
-        </p:txBody>
-      </p:sp>
-      <p:sp>
-        <p:nvSpPr>
-          <p:cNvPr id="3" name="Content Placeholder 2"/>
-          <p:cNvSpPr>
-            <a:spLocks noGrp="1"/>
-          </p:cNvSpPr>
-          <p:nvPr>
-            <p:ph idx="1"/>
-          </p:nvPr>
-        </p:nvSpPr>
-        <p:spPr>
-          <a:xfrm>
-            <a:off x="304800" y="1143000"/>
-            <a:ext cx="4648200" cy="5562600"/>
-          </a:xfrm>
-        </p:spPr>
-        <p:txBody>
-          <a:bodyPr>
-            <a:normAutofit fontScale="92500" lnSpcReduction="10000"/>
-          </a:bodyPr>
-          <a:lstStyle/>
-          <a:p>
-            <a:r>
-              <a:rPr lang="en-GB" sz="4400" dirty="0" smtClean="0">
-                <a:solidFill>
-                  <a:schemeClr val="bg1"/>
-                </a:solidFill>
-                <a:latin typeface="Courier New" pitchFamily="49" charset="0"/>
-                <a:cs typeface="Courier New" pitchFamily="49" charset="0"/>
-              </a:rPr>
-              <a:t>ID Resolver!</a:t>
-            </a:r>
-          </a:p>
-          <a:p>
-            <a:r>
-              <a:rPr lang="en-GB" sz="4400" dirty="0" smtClean="0">
-                <a:solidFill>
-                  <a:schemeClr val="bg1"/>
-                </a:solidFill>
-                <a:latin typeface="Courier New" pitchFamily="49" charset="0"/>
-                <a:cs typeface="Courier New" pitchFamily="49" charset="0"/>
-              </a:rPr>
-              <a:t>Who are you?</a:t>
-            </a:r>
-          </a:p>
-          <a:p>
-            <a:r>
-              <a:rPr lang="en-GB" sz="4400" dirty="0" smtClean="0">
-                <a:solidFill>
-                  <a:schemeClr val="bg1"/>
-                </a:solidFill>
-                <a:latin typeface="Courier New" pitchFamily="49" charset="0"/>
-                <a:cs typeface="Courier New" pitchFamily="49" charset="0"/>
-              </a:rPr>
-              <a:t>Existing application!</a:t>
-            </a:r>
-          </a:p>
-          <a:p>
-            <a:r>
-              <a:rPr lang="en-GB" sz="4400" dirty="0" smtClean="0">
-                <a:solidFill>
-                  <a:schemeClr val="bg1"/>
-                </a:solidFill>
-                <a:latin typeface="Courier New" pitchFamily="49" charset="0"/>
-                <a:cs typeface="Courier New" pitchFamily="49" charset="0"/>
-              </a:rPr>
-              <a:t>History!</a:t>
-            </a:r>
-          </a:p>
-          <a:p>
-            <a:r>
-              <a:rPr lang="en-GB" sz="4400" dirty="0" smtClean="0">
-                <a:solidFill>
-                  <a:schemeClr val="bg1"/>
-                </a:solidFill>
-                <a:latin typeface="Courier New" pitchFamily="49" charset="0"/>
-                <a:cs typeface="Courier New" pitchFamily="49" charset="0"/>
-              </a:rPr>
-              <a:t>Clients!</a:t>
-            </a:r>
-          </a:p>
-          <a:p>
-            <a:r>
-              <a:rPr lang="en-GB" sz="4400" dirty="0" err="1" smtClean="0">
-                <a:solidFill>
-                  <a:schemeClr val="bg1"/>
-                </a:solidFill>
-                <a:latin typeface="Courier New" pitchFamily="49" charset="0"/>
-                <a:cs typeface="Courier New" pitchFamily="49" charset="0"/>
-              </a:rPr>
-              <a:t>Dev</a:t>
-            </a:r>
-            <a:r>
-              <a:rPr lang="en-GB" sz="4400" dirty="0" smtClean="0">
-                <a:solidFill>
-                  <a:schemeClr val="bg1"/>
-                </a:solidFill>
-                <a:latin typeface="Courier New" pitchFamily="49" charset="0"/>
-                <a:cs typeface="Courier New" pitchFamily="49" charset="0"/>
-              </a:rPr>
-              <a:t> team!</a:t>
-            </a:r>
-          </a:p>
-          <a:p>
-            <a:r>
-              <a:rPr lang="en-GB" sz="4400" dirty="0" smtClean="0">
-                <a:solidFill>
-                  <a:schemeClr val="bg1"/>
-                </a:solidFill>
-                <a:latin typeface="Courier New" pitchFamily="49" charset="0"/>
-                <a:cs typeface="Courier New" pitchFamily="49" charset="0"/>
-              </a:rPr>
-              <a:t>Support Team!</a:t>
-            </a:r>
-          </a:p>
-        </p:txBody>
-      </p:sp>
-      <p:pic>
-        <p:nvPicPr>
-          <p:cNvPr id="6" name="Picture 5"/>
-          <p:cNvPicPr>
-            <a:picLocks noChangeAspect="1"/>
-          </p:cNvPicPr>
-          <p:nvPr/>
-        </p:nvPicPr>
-        <p:blipFill>
-          <a:blip r:embed="rId3"/>
-          <a:stretch>
-            <a:fillRect/>
-          </a:stretch>
-        </p:blipFill>
-        <p:spPr>
-          <a:xfrm>
-            <a:off x="5334000" y="1295400"/>
-            <a:ext cx="3352800" cy="5105400"/>
-          </a:xfrm>
-          <a:prstGeom prst="rect">
-            <a:avLst/>
-          </a:prstGeom>
-        </p:spPr>
-      </p:pic>
-    </p:spTree>
-    <p:extLst>
-      <p:ext uri="{BB962C8B-B14F-4D97-AF65-F5344CB8AC3E}">
-        <p14:creationId xmlns:p14="http://schemas.microsoft.com/office/powerpoint/2010/main" val="4231072037"/>
-      </p:ext>
-    </p:extLst>
-  </p:cSld>
-  <p:clrMapOvr>
-    <a:masterClrMapping/>
-  </p:clrMapOvr>
-  <mc:AlternateContent xmlns:mc="http://schemas.openxmlformats.org/markup-compatibility/2006" xmlns:p14="http://schemas.microsoft.com/office/powerpoint/2010/main">
-    <mc:Choice Requires="p14">
-      <p:transition p14:dur="100">
-        <p:cut/>
-      </p:transition>
-    </mc:Choice>
-    <mc:Fallback xmlns="">
-      <p:transition xmlns:p14="http://schemas.microsoft.com/office/powerpoint/2010/main">
-        <p:cut/>
-      </p:transition>
-    </mc:Fallback>
-  </mc:AlternateContent>
-  <p:timing>
-    <p:tnLst>
-      <p:par>
-        <p:cTn xmlns:p14="http://schemas.microsoft.com/office/powerpoint/2010/main" id="1" dur="indefinite" restart="never" nodeType="tmRoot">
-          <p:childTnLst>
-            <p:seq concurrent="1" nextAc="seek">
-              <p:cTn id="2" dur="indefinite" nodeType="mainSeq">
-                <p:childTnLst>
-                  <p:par>
-                    <p:cTn id="3" fill="hold">
-                      <p:stCondLst>
-                        <p:cond delay="indefinite"/>
-                      </p:stCondLst>
-                      <p:childTnLst>
-                        <p:par>
-                          <p:cTn id="4" fill="hold">
-                            <p:stCondLst>
-                              <p:cond delay="0"/>
-                            </p:stCondLst>
-                            <p:childTnLst>
-                              <p:par>
-                                <p:cTn id="5" presetID="1" presetClass="entr" presetSubtype="0" fill="hold" nodeType="clickEffect">
-                                  <p:stCondLst>
-                                    <p:cond delay="0"/>
-                                  </p:stCondLst>
-                                  <p:childTnLst>
-                                    <p:set>
-                                      <p:cBhvr>
-                                        <p:cTn id="6" dur="1" fill="hold">
-                                          <p:stCondLst>
-                                            <p:cond delay="0"/>
-                                          </p:stCondLst>
-                                        </p:cTn>
-                                        <p:tgtEl>
-                                          <p:spTgt spid="3">
-                                            <p:txEl>
-                                              <p:pRg st="0" end="0"/>
-                                            </p:txEl>
-                                          </p:spTgt>
-                                        </p:tgtEl>
-                                        <p:attrNameLst>
-                                          <p:attrName>style.visibility</p:attrName>
-                                        </p:attrNameLst>
-                                      </p:cBhvr>
-                                      <p:to>
-                                        <p:strVal val="visible"/>
-                                      </p:to>
-                                    </p:set>
-                                  </p:childTnLst>
-                                </p:cTn>
-                              </p:par>
-                            </p:childTnLst>
-                          </p:cTn>
-                        </p:par>
-                      </p:childTnLst>
-                    </p:cTn>
-                  </p:par>
-                  <p:par>
-                    <p:cTn id="7" fill="hold">
-                      <p:stCondLst>
-                        <p:cond delay="indefinite"/>
-                      </p:stCondLst>
-                      <p:childTnLst>
-                        <p:par>
-                          <p:cTn id="8" fill="hold">
-                            <p:stCondLst>
-                              <p:cond delay="0"/>
-                            </p:stCondLst>
-                            <p:childTnLst>
-                              <p:par>
-                                <p:cTn id="9" presetID="1" presetClass="entr" presetSubtype="0" fill="hold" nodeType="clickEffect">
-                                  <p:stCondLst>
-                                    <p:cond delay="0"/>
-                                  </p:stCondLst>
-                                  <p:childTnLst>
-                                    <p:set>
-                                      <p:cBhvr>
-                                        <p:cTn id="10" dur="1" fill="hold">
-                                          <p:stCondLst>
-                                            <p:cond delay="0"/>
-                                          </p:stCondLst>
-                                        </p:cTn>
-                                        <p:tgtEl>
-                                          <p:spTgt spid="3">
-                                            <p:txEl>
-                                              <p:pRg st="1" end="1"/>
-                                            </p:txEl>
-                                          </p:spTgt>
-                                        </p:tgtEl>
-                                        <p:attrNameLst>
-                                          <p:attrName>style.visibility</p:attrName>
-                                        </p:attrNameLst>
-                                      </p:cBhvr>
-                                      <p:to>
-                                        <p:strVal val="visible"/>
-                                      </p:to>
-                                    </p:set>
-                                  </p:childTnLst>
-                                </p:cTn>
-                              </p:par>
-                            </p:childTnLst>
-                          </p:cTn>
-                        </p:par>
-                      </p:childTnLst>
-                    </p:cTn>
-                  </p:par>
-                  <p:par>
-                    <p:cTn id="11" fill="hold">
-                      <p:stCondLst>
-                        <p:cond delay="indefinite"/>
-                      </p:stCondLst>
-                      <p:childTnLst>
-                        <p:par>
-                          <p:cTn id="12" fill="hold">
-                            <p:stCondLst>
-                              <p:cond delay="0"/>
-                            </p:stCondLst>
-                            <p:childTnLst>
-                              <p:par>
-                                <p:cTn id="13" presetID="1" presetClass="entr" presetSubtype="0" fill="hold" nodeType="clickEffect">
-                                  <p:stCondLst>
-                                    <p:cond delay="0"/>
-                                  </p:stCondLst>
-                                  <p:childTnLst>
-                                    <p:set>
-                                      <p:cBhvr>
-                                        <p:cTn id="14" dur="1" fill="hold">
-                                          <p:stCondLst>
-                                            <p:cond delay="0"/>
-                                          </p:stCondLst>
-                                        </p:cTn>
-                                        <p:tgtEl>
-                                          <p:spTgt spid="3">
-                                            <p:txEl>
-                                              <p:pRg st="2" end="2"/>
-                                            </p:txEl>
-                                          </p:spTgt>
-                                        </p:tgtEl>
-                                        <p:attrNameLst>
-                                          <p:attrName>style.visibility</p:attrName>
-                                        </p:attrNameLst>
-                                      </p:cBhvr>
-                                      <p:to>
-                                        <p:strVal val="visible"/>
-                                      </p:to>
-                                    </p:set>
-                                  </p:childTnLst>
-                                </p:cTn>
-                              </p:par>
-                            </p:childTnLst>
-                          </p:cTn>
-                        </p:par>
-                      </p:childTnLst>
-                    </p:cTn>
-                  </p:par>
                   <p:par>
                     <p:cTn id="15" fill="hold">
                       <p:stCondLst>
@@ -5369,7 +5148,7 @@
                                         <p:tgtEl>
                                           <p:spTgt spid="3">
                                             <p:txEl>
-                                              <p:pRg st="3" end="3"/>
+                                              <p:pRg st="4" end="4"/>
                                             </p:txEl>
                                           </p:spTgt>
                                         </p:tgtEl>
@@ -5418,7 +5197,7 @@
                                         <p:tgtEl>
                                           <p:spTgt spid="3">
                                             <p:txEl>
-                                              <p:pRg st="4" end="4"/>
+                                              <p:pRg st="5" end="5"/>
                                             </p:txEl>
                                           </p:spTgt>
                                         </p:tgtEl>
@@ -5460,55 +5239,6 @@
                                     <p:set>
                                       <p:cBhvr>
                                         <p:cTn id="26" dur="1" fill="hold">
-                                          <p:stCondLst>
-                                            <p:cond delay="0"/>
-                                          </p:stCondLst>
-                                        </p:cTn>
-                                        <p:tgtEl>
-                                          <p:spTgt spid="3">
-                                            <p:txEl>
-                                              <p:pRg st="5" end="5"/>
-                                            </p:txEl>
-                                          </p:spTgt>
-                                        </p:tgtEl>
-                                        <p:attrNameLst>
-                                          <p:attrName>style.visibility</p:attrName>
-                                        </p:attrNameLst>
-                                      </p:cBhvr>
-                                      <p:to>
-                                        <p:strVal val="visible"/>
-                                      </p:to>
-                                    </p:set>
-                                  </p:childTnLst>
-                                </p:cTn>
-                              </p:par>
-                            </p:childTnLst>
-                          </p:cTn>
-                        </p:par>
-                      </p:childTnLst>
-                    </p:cTn>
-                  </p:par>
-                  <p:par>
-                    <p:cTn id="27" fill="hold">
-                      <p:stCondLst>
-                        <p:cond delay="indefinite"/>
-                      </p:stCondLst>
-                      <p:childTnLst>
-                        <p:par>
-                          <p:cTn id="28" fill="hold">
-                            <p:stCondLst>
-                              <p:cond delay="0"/>
-                            </p:stCondLst>
-                            <p:childTnLst>
-                              <p:par>
-                                <p:cTn id="29" presetID="1" presetClass="entr" presetSubtype="0" fill="hold" nodeType="clickEffect">
-                                  <p:stCondLst>
-                                    <p:cond delay="0"/>
-                                  </p:stCondLst>
-                                  <p:childTnLst>
-                                    <p:set>
-                                      <p:cBhvr>
-                                        <p:cTn id="30" dur="1" fill="hold">
                                           <p:stCondLst>
                                             <p:cond delay="0"/>
                                           </p:stCondLst>
@@ -5591,33 +5321,26 @@
         </p:nvSpPr>
         <p:spPr>
           <a:xfrm>
-            <a:off x="304800" y="228600"/>
-            <a:ext cx="8534400" cy="1143000"/>
+            <a:off x="304800" y="304800"/>
+            <a:ext cx="8534400" cy="838200"/>
           </a:xfrm>
         </p:spPr>
         <p:txBody>
           <a:bodyPr>
-            <a:normAutofit/>
+            <a:normAutofit fontScale="90000"/>
           </a:bodyPr>
           <a:lstStyle/>
           <a:p>
             <a:r>
-              <a:rPr lang="en-GB" sz="5400" b="1" dirty="0" smtClean="0">
+              <a:rPr lang="en-GB" sz="5400" b="1" dirty="0">
                 <a:solidFill>
                   <a:schemeClr val="bg1"/>
                 </a:solidFill>
                 <a:latin typeface="Courier New" pitchFamily="49" charset="0"/>
                 <a:cs typeface="Courier New" pitchFamily="49" charset="0"/>
               </a:rPr>
-              <a:t>Oracles!</a:t>
-            </a:r>
-            <a:endParaRPr lang="en-GB" sz="5400" b="1" dirty="0">
-              <a:solidFill>
-                <a:schemeClr val="bg1"/>
-              </a:solidFill>
-              <a:latin typeface="Courier New" pitchFamily="49" charset="0"/>
-              <a:cs typeface="Courier New" pitchFamily="49" charset="0"/>
-            </a:endParaRPr>
+              <a:t>Story so far</a:t>
+            </a:r>
           </a:p>
         </p:txBody>
       </p:sp>
@@ -5633,105 +5356,145 @@
         </p:nvSpPr>
         <p:spPr>
           <a:xfrm>
-            <a:off x="304800" y="1524000"/>
-            <a:ext cx="4343400" cy="4953000"/>
+            <a:off x="304800" y="1295400"/>
+            <a:ext cx="8534400" cy="5181600"/>
           </a:xfrm>
         </p:spPr>
         <p:txBody>
           <a:bodyPr>
-            <a:normAutofit lnSpcReduction="10000"/>
+            <a:noAutofit/>
           </a:bodyPr>
           <a:lstStyle/>
           <a:p>
             <a:r>
-              <a:rPr lang="en-GB" sz="4400" dirty="0" smtClean="0">
+              <a:rPr lang="en-GB" sz="2000" dirty="0">
                 <a:solidFill>
                   <a:schemeClr val="bg1"/>
                 </a:solidFill>
                 <a:latin typeface="Courier New" pitchFamily="49" charset="0"/>
                 <a:cs typeface="Courier New" pitchFamily="49" charset="0"/>
               </a:rPr>
-              <a:t>Symbols!</a:t>
-            </a:r>
-          </a:p>
-          <a:p>
-            <a:r>
-              <a:rPr lang="en-GB" sz="4400" dirty="0" smtClean="0">
+              <a:t>ID Resolver – a credit application processor, decides based on your credit card, bank account and address history whether or not to loan you money.</a:t>
+            </a:r>
+          </a:p>
+          <a:p>
+            <a:r>
+              <a:rPr lang="en-GB" sz="2000" dirty="0">
                 <a:solidFill>
                   <a:schemeClr val="bg1"/>
                 </a:solidFill>
                 <a:latin typeface="Courier New" pitchFamily="49" charset="0"/>
                 <a:cs typeface="Courier New" pitchFamily="49" charset="0"/>
               </a:rPr>
-              <a:t>Anecdotes!</a:t>
-            </a:r>
-          </a:p>
-          <a:p>
-            <a:r>
-              <a:rPr lang="en-GB" sz="4400" dirty="0" smtClean="0">
+              <a:t>You are a new internal development team, picking up this application from the previous builders and maintainers, who have (nearly) all moved on.</a:t>
+            </a:r>
+          </a:p>
+          <a:p>
+            <a:r>
+              <a:rPr lang="en-GB" sz="2000" dirty="0">
                 <a:solidFill>
                   <a:schemeClr val="bg1"/>
                 </a:solidFill>
                 <a:latin typeface="Courier New" pitchFamily="49" charset="0"/>
                 <a:cs typeface="Courier New" pitchFamily="49" charset="0"/>
               </a:rPr>
-              <a:t>Bugs!</a:t>
-            </a:r>
-          </a:p>
-          <a:p>
-            <a:r>
-              <a:rPr lang="en-GB" sz="4400" dirty="0" smtClean="0">
+              <a:t>The application runs on Linux and is built in </a:t>
+            </a:r>
+            <a:r>
+              <a:rPr lang="en-GB" sz="2000" dirty="0" err="1">
                 <a:solidFill>
                   <a:schemeClr val="bg1"/>
                 </a:solidFill>
                 <a:latin typeface="Courier New" pitchFamily="49" charset="0"/>
                 <a:cs typeface="Courier New" pitchFamily="49" charset="0"/>
               </a:rPr>
-              <a:t>Original Diagrams!</a:t>
-            </a:r>
-          </a:p>
-          <a:p>
-            <a:r>
-              <a:rPr lang="en-GB" sz="4400" dirty="0" smtClean="0">
+              <a:t>php</a:t>
+            </a:r>
+            <a:r>
+              <a:rPr lang="en-GB" sz="2000" dirty="0">
                 <a:solidFill>
                   <a:schemeClr val="bg1"/>
                 </a:solidFill>
                 <a:latin typeface="Courier New" pitchFamily="49" charset="0"/>
                 <a:cs typeface="Courier New" pitchFamily="49" charset="0"/>
               </a:rPr>
-              <a:t>Performance Stats!</a:t>
-            </a:r>
-          </a:p>
-        </p:txBody>
-      </p:sp>
-      <p:pic>
-        <p:nvPicPr>
-          <p:cNvPr id="5" name="Picture 4"/>
-          <p:cNvPicPr>
-            <a:picLocks noChangeAspect="1"/>
-          </p:cNvPicPr>
-          <p:nvPr/>
-        </p:nvPicPr>
-        <p:blipFill>
-          <a:blip r:embed="rId3"/>
-          <a:stretch>
-            <a:fillRect/>
-          </a:stretch>
-        </p:blipFill>
-        <p:spPr>
-          <a:xfrm>
-            <a:off x="4953000" y="1567542"/>
-            <a:ext cx="3759200" cy="4833257"/>
-          </a:xfrm>
-          <a:prstGeom prst="rect">
-            <a:avLst/>
-          </a:prstGeom>
-        </p:spPr>
-      </p:pic>
+              <a:t> primarily, with predominantly HTTP API consumers, but some web based consumers too. </a:t>
+            </a:r>
+          </a:p>
+          <a:p>
+            <a:r>
+              <a:rPr lang="en-GB" sz="2000" dirty="0">
+                <a:solidFill>
+                  <a:schemeClr val="bg1"/>
+                </a:solidFill>
+                <a:latin typeface="Courier New" pitchFamily="49" charset="0"/>
+                <a:cs typeface="Courier New" pitchFamily="49" charset="0"/>
+              </a:rPr>
+              <a:t>The data storage is in MySQL, caching uses </a:t>
+            </a:r>
+            <a:r>
+              <a:rPr lang="en-GB" sz="2000" dirty="0" err="1">
+                <a:solidFill>
+                  <a:schemeClr val="bg1"/>
+                </a:solidFill>
+                <a:latin typeface="Courier New" pitchFamily="49" charset="0"/>
+                <a:cs typeface="Courier New" pitchFamily="49" charset="0"/>
+              </a:rPr>
+              <a:t>Memcache</a:t>
+            </a:r>
+            <a:r>
+              <a:rPr lang="en-GB" sz="2000" dirty="0">
+                <a:solidFill>
+                  <a:schemeClr val="bg1"/>
+                </a:solidFill>
+                <a:latin typeface="Courier New" pitchFamily="49" charset="0"/>
+                <a:cs typeface="Courier New" pitchFamily="49" charset="0"/>
+              </a:rPr>
+              <a:t>.</a:t>
+            </a:r>
+          </a:p>
+          <a:p>
+            <a:r>
+              <a:rPr lang="en-GB" sz="2000" dirty="0">
+                <a:solidFill>
+                  <a:schemeClr val="bg1"/>
+                </a:solidFill>
+                <a:latin typeface="Courier New" pitchFamily="49" charset="0"/>
+                <a:cs typeface="Courier New" pitchFamily="49" charset="0"/>
+              </a:rPr>
+              <a:t>The original team built it as a proof of concept but that quickly became the production system. Scaling issues have been prevalent since.</a:t>
+            </a:r>
+          </a:p>
+          <a:p>
+            <a:r>
+              <a:rPr lang="en-GB" sz="2000" dirty="0">
+                <a:solidFill>
+                  <a:schemeClr val="bg1"/>
+                </a:solidFill>
+                <a:latin typeface="Courier New" pitchFamily="49" charset="0"/>
+                <a:cs typeface="Courier New" pitchFamily="49" charset="0"/>
+              </a:rPr>
+              <a:t>The product is supported by a Database admin team, a single Linux Sys Admin and the main service desk.</a:t>
+            </a:r>
+          </a:p>
+          <a:p>
+            <a:r>
+              <a:rPr lang="en-GB" sz="2000" dirty="0">
+                <a:solidFill>
+                  <a:schemeClr val="bg1"/>
+                </a:solidFill>
+                <a:latin typeface="Courier New" pitchFamily="49" charset="0"/>
+                <a:cs typeface="Courier New" pitchFamily="49" charset="0"/>
+              </a:rPr>
+              <a:t>Ash is the only surviving member of the old team…</a:t>
+            </a:r>
+          </a:p>
+        </p:txBody>
+      </p:sp>
     </p:spTree>
     <p:extLst>
       <p:ext uri="{BB962C8B-B14F-4D97-AF65-F5344CB8AC3E}">
-        <p14:creationId xmlns:p14="http://schemas.microsoft.com/office/powerpoint/2010/main" val="4059101004"/>
+        <p14:creationId xmlns:p14="http://schemas.microsoft.com/office/powerpoint/2010/main" val="4231072037"/>
       </p:ext>
     </p:extLst>
   </p:cSld>
@@ -5753,7 +5516,7 @@
   <p:timing>
     <p:tnLst>
       <p:par>
-        <p:cTn xmlns:p14="http://schemas.microsoft.com/office/powerpoint/2010/main" id="1" dur="indefinite" restart="never" nodeType="tmRoot">
+        <p:cTn id="1" dur="indefinite" restart="never" nodeType="tmRoot">
           <p:childTnLst>
             <p:seq concurrent="1" nextAc="seek">
               <p:cTn id="2" dur="indefinite" nodeType="mainSeq">
@@ -5786,7 +5549,7 @@
                                         <p:tgtEl>
                                           <p:spTgt spid="3">
                                             <p:txEl>
-                                              <p:pRg st="0" end="0"/>
+                                              <p:pRg st="1" end="1"/>
                                             </p:txEl>
                                           </p:spTgt>
                                         </p:tgtEl>
@@ -5835,7 +5598,7 @@
                                         <p:tgtEl>
                                           <p:spTgt spid="3">
                                             <p:txEl>
-                                              <p:pRg st="1" end="1"/>
+                                              <p:pRg st="2" end="2"/>
                                             </p:txEl>
                                           </p:spTgt>
                                         </p:tgtEl>
@@ -5884,7 +5647,7 @@
                                         <p:tgtEl>
                                           <p:spTgt spid="3">
                                             <p:txEl>
-                                              <p:pRg st="2" end="2"/>
+                                              <p:pRg st="3" end="3"/>
                                             </p:txEl>
                                           </p:spTgt>
                                         </p:tgtEl>
@@ -5933,7 +5696,7 @@
                                         <p:tgtEl>
                                           <p:spTgt spid="3">
                                             <p:txEl>
-                                              <p:pRg st="3" end="3"/>
+                                              <p:pRg st="4" end="4"/>
                                             </p:txEl>
                                           </p:spTgt>
                                         </p:tgtEl>
@@ -5982,7 +5745,56 @@
                                         <p:tgtEl>
                                           <p:spTgt spid="3">
                                             <p:txEl>
-                                              <p:pRg st="4" end="4"/>
+                                              <p:pRg st="5" end="5"/>
+                                            </p:txEl>
+                                          </p:spTgt>
+                                        </p:tgtEl>
+                                        <p:attrNameLst>
+                                          <p:attrName>style.visibility</p:attrName>
+                                        </p:attrNameLst>
+                                      </p:cBhvr>
+                                      <p:to>
+                                        <p:strVal val="visible"/>
+                                      </p:to>
+                                    </p:set>
+                                  </p:childTnLst>
+                                </p:cTn>
+                              </p:par>
+                            </p:childTnLst>
+                          </p:cTn>
+                        </p:par>
+                      </p:childTnLst>
+                    </p:cTn>
+                  </p:par>
+                  <p:par>
+                    <p:cTn id="23" fill="hold">
+                      <p:stCondLst>
+                        <p:cond delay="indefinite"/>
+                      </p:stCondLst>
+                      <p:childTnLst>
+                        <p:par>
+                          <p:cTn id="24" fill="hold">
+                            <p:stCondLst>
+                              <p:cond delay="0"/>
+                            </p:stCondLst>
+                            <p:childTnLst>
+                              <p:par>
+                                <p:cTn id="25" presetID="1" presetClass="entr" presetSubtype="0" fill="hold" nodeType="clickEffect">
+                                  <p:stCondLst>
+                                    <p:cond delay="0"/>
+                                  </p:stCondLst>
+                                  <p:childTnLst>
+                                    <p:set>
+                                      <p:cBhvr>
+                                        <p:cTn id="26" dur="1" fill="hold">
+                                          <p:stCondLst>
+                                            <p:cond delay="0"/>
+                                          </p:stCondLst>
+                                        </p:cTn>
+                                        <p:tgtEl>
+                                          <p:spTgt spid="3">
+                                            <p:txEl>
+                                              <p:pRg st="6" end="6"/>
                                             </p:txEl>
                                           </p:spTgt>
                                         </p:tgtEl>
@@ -6068,7 +5880,7 @@
           <a:lstStyle/>
           <a:p>
             <a:r>
-              <a:rPr lang="en-GB" b="1" dirty="0" smtClean="0">
+              <a:rPr lang="en-GB" b="1" dirty="0">
                 <a:solidFill>
                   <a:schemeClr val="bg1"/>
                 </a:solidFill>
@@ -6077,122 +5889,235 @@
               </a:rPr>
               <a:t>Par example…</a:t>
             </a:r>
-            <a:endParaRPr lang="en-GB" b="1" dirty="0">
-              <a:solidFill>
-                <a:schemeClr val="bg1"/>
-              </a:solidFill>
-              <a:latin typeface="Courier New" pitchFamily="49" charset="0"/>
-              <a:cs typeface="Courier New" pitchFamily="49" charset="0"/>
-            </a:endParaRPr>
+          </a:p>
+        </p:txBody>
+      </p:sp>
+      <p:sp>
+        <p:nvSpPr>
+          <p:cNvPr id="8" name="Content Placeholder 2">
+            <a:extLst>
+              <a:ext uri="{FF2B5EF4-FFF2-40B4-BE49-F238E27FC236}">
+                <a16:creationId xmlns:a16="http://schemas.microsoft.com/office/drawing/2014/main" id="{058AEE13-D7E3-754D-8BA1-6D28F8C24913}"/>
+              </a:ext>
+            </a:extLst>
+          </p:cNvPr>
+          <p:cNvSpPr txBox="1">
+            <a:spLocks/>
+          </p:cNvSpPr>
+          <p:nvPr/>
+        </p:nvSpPr>
+        <p:spPr>
+          <a:xfrm>
+            <a:off x="5334000" y="1295400"/>
+            <a:ext cx="3657600" cy="5181600"/>
+          </a:xfrm>
+          <a:prstGeom prst="rect">
+            <a:avLst/>
+          </a:prstGeom>
+        </p:spPr>
+        <p:txBody>
+          <a:bodyPr vert="horz" lIns="91440" tIns="45720" rIns="91440" bIns="45720" rtlCol="0">
+            <a:normAutofit fontScale="77500" lnSpcReduction="20000"/>
+          </a:bodyPr>
+          <a:lstStyle>
+            <a:lvl1pPr marL="342900" indent="-342900" algn="l" defTabSz="914400" rtl="0" eaLnBrk="1" latinLnBrk="0" hangingPunct="1">
+              <a:spcBef>
+                <a:spcPct val="20000"/>
+              </a:spcBef>
+              <a:buFont typeface="Arial" pitchFamily="34" charset="0"/>
+              <a:buChar char="•"/>
+              <a:defRPr sz="3200" kern="1200">
+                <a:solidFill>
+                  <a:schemeClr val="tx1"/>
+                </a:solidFill>
+                <a:latin typeface="+mn-lt"/>
+                <a:ea typeface="+mn-ea"/>
+                <a:cs typeface="+mn-cs"/>
+              </a:defRPr>
+            </a:lvl1pPr>
+            <a:lvl2pPr marL="742950" indent="-285750" algn="l" defTabSz="914400" rtl="0" eaLnBrk="1" latinLnBrk="0" hangingPunct="1">
+              <a:spcBef>
+                <a:spcPct val="20000"/>
+              </a:spcBef>
+              <a:buFont typeface="Arial" pitchFamily="34" charset="0"/>
+              <a:buChar char="–"/>
+              <a:defRPr sz="2800" kern="1200">
+                <a:solidFill>
+                  <a:schemeClr val="tx1"/>
+                </a:solidFill>
+                <a:latin typeface="+mn-lt"/>
+                <a:ea typeface="+mn-ea"/>
+                <a:cs typeface="+mn-cs"/>
+              </a:defRPr>
+            </a:lvl2pPr>
+            <a:lvl3pPr marL="1143000" indent="-228600" algn="l" defTabSz="914400" rtl="0" eaLnBrk="1" latinLnBrk="0" hangingPunct="1">
+              <a:spcBef>
+                <a:spcPct val="20000"/>
+              </a:spcBef>
+              <a:buFont typeface="Arial" pitchFamily="34" charset="0"/>
+              <a:buChar char="•"/>
+              <a:defRPr sz="2400" kern="1200">
+                <a:solidFill>
+                  <a:schemeClr val="tx1"/>
+                </a:solidFill>
+                <a:latin typeface="+mn-lt"/>
+                <a:ea typeface="+mn-ea"/>
+                <a:cs typeface="+mn-cs"/>
+              </a:defRPr>
+            </a:lvl3pPr>
+            <a:lvl4pPr marL="1600200" indent="-228600" algn="l" defTabSz="914400" rtl="0" eaLnBrk="1" latinLnBrk="0" hangingPunct="1">
+              <a:spcBef>
+                <a:spcPct val="20000"/>
+              </a:spcBef>
+              <a:buFont typeface="Arial" pitchFamily="34" charset="0"/>
+              <a:buChar char="–"/>
+              <a:defRPr sz="2000" kern="1200">
+                <a:solidFill>
+                  <a:schemeClr val="tx1"/>
+                </a:solidFill>
+                <a:latin typeface="+mn-lt"/>
+                <a:ea typeface="+mn-ea"/>
+                <a:cs typeface="+mn-cs"/>
+              </a:defRPr>
+            </a:lvl4pPr>
+            <a:lvl5pPr marL="2057400" indent="-228600" algn="l" defTabSz="914400" rtl="0" eaLnBrk="1" latinLnBrk="0" hangingPunct="1">
+              <a:spcBef>
+                <a:spcPct val="20000"/>
+              </a:spcBef>
+              <a:buFont typeface="Arial" pitchFamily="34" charset="0"/>
+              <a:buChar char="»"/>
+              <a:defRPr sz="2000" kern="1200">
+                <a:solidFill>
+                  <a:schemeClr val="tx1"/>
+                </a:solidFill>
+                <a:latin typeface="+mn-lt"/>
+                <a:ea typeface="+mn-ea"/>
+                <a:cs typeface="+mn-cs"/>
+              </a:defRPr>
+            </a:lvl5pPr>
+            <a:lvl6pPr marL="2514600" indent="-228600" algn="l" defTabSz="914400" rtl="0" eaLnBrk="1" latinLnBrk="0" hangingPunct="1">
+              <a:spcBef>
+                <a:spcPct val="20000"/>
+              </a:spcBef>
+              <a:buFont typeface="Arial" pitchFamily="34" charset="0"/>
+              <a:buChar char="•"/>
+              <a:defRPr sz="2000" kern="1200">
+                <a:solidFill>
+                  <a:schemeClr val="tx1"/>
+                </a:solidFill>
+                <a:latin typeface="+mn-lt"/>
+                <a:ea typeface="+mn-ea"/>
+                <a:cs typeface="+mn-cs"/>
+              </a:defRPr>
+            </a:lvl6pPr>
+            <a:lvl7pPr marL="2971800" indent="-228600" algn="l" defTabSz="914400" rtl="0" eaLnBrk="1" latinLnBrk="0" hangingPunct="1">
+              <a:spcBef>
+                <a:spcPct val="20000"/>
+              </a:spcBef>
+              <a:buFont typeface="Arial" pitchFamily="34" charset="0"/>
+              <a:buChar char="•"/>
+              <a:defRPr sz="2000" kern="1200">
+                <a:solidFill>
+                  <a:schemeClr val="tx1"/>
+                </a:solidFill>
+                <a:latin typeface="+mn-lt"/>
+                <a:ea typeface="+mn-ea"/>
+                <a:cs typeface="+mn-cs"/>
+              </a:defRPr>
+            </a:lvl7pPr>
+            <a:lvl8pPr marL="3429000" indent="-228600" algn="l" defTabSz="914400" rtl="0" eaLnBrk="1" latinLnBrk="0" hangingPunct="1">
+              <a:spcBef>
+                <a:spcPct val="20000"/>
+              </a:spcBef>
+              <a:buFont typeface="Arial" pitchFamily="34" charset="0"/>
+              <a:buChar char="•"/>
+              <a:defRPr sz="2000" kern="1200">
+                <a:solidFill>
+                  <a:schemeClr val="tx1"/>
+                </a:solidFill>
+                <a:latin typeface="+mn-lt"/>
+                <a:ea typeface="+mn-ea"/>
+                <a:cs typeface="+mn-cs"/>
+              </a:defRPr>
+            </a:lvl8pPr>
+            <a:lvl9pPr marL="3886200" indent="-228600" algn="l" defTabSz="914400" rtl="0" eaLnBrk="1" latinLnBrk="0" hangingPunct="1">
+              <a:spcBef>
+                <a:spcPct val="20000"/>
+              </a:spcBef>
+              <a:buFont typeface="Arial" pitchFamily="34" charset="0"/>
+              <a:buChar char="•"/>
+              <a:defRPr sz="2000" kern="1200">
+                <a:solidFill>
+                  <a:schemeClr val="tx1"/>
+                </a:solidFill>
+                <a:latin typeface="+mn-lt"/>
+                <a:ea typeface="+mn-ea"/>
+                <a:cs typeface="+mn-cs"/>
+              </a:defRPr>
+            </a:lvl9pPr>
+          </a:lstStyle>
+          <a:p>
+            <a:r>
+              <a:rPr lang="en-GB" sz="4400" dirty="0">
+                <a:solidFill>
+                  <a:schemeClr val="bg1"/>
+                </a:solidFill>
+                <a:latin typeface="Courier New" pitchFamily="49" charset="0"/>
+                <a:cs typeface="Courier New" pitchFamily="49" charset="0"/>
+              </a:rPr>
+              <a:t>Produce a diagram of the architecture as it is now</a:t>
+            </a:r>
+          </a:p>
+          <a:p>
+            <a:r>
+              <a:rPr lang="en-GB" sz="4400" dirty="0">
+                <a:solidFill>
+                  <a:schemeClr val="bg1"/>
+                </a:solidFill>
+                <a:latin typeface="Courier New" pitchFamily="49" charset="0"/>
+                <a:cs typeface="Courier New" pitchFamily="49" charset="0"/>
+              </a:rPr>
+              <a:t>Based on the oracles provided</a:t>
+            </a:r>
+          </a:p>
+          <a:p>
+            <a:r>
+              <a:rPr lang="en-GB" sz="4400" dirty="0">
+                <a:solidFill>
+                  <a:schemeClr val="bg1"/>
+                </a:solidFill>
+                <a:latin typeface="Courier New" pitchFamily="49" charset="0"/>
+                <a:cs typeface="Courier New" pitchFamily="49" charset="0"/>
+              </a:rPr>
+              <a:t>Start with the original diagram…</a:t>
+            </a:r>
           </a:p>
         </p:txBody>
       </p:sp>
       <p:pic>
         <p:nvPicPr>
-          <p:cNvPr id="6" name="Picture 5" descr="Screen Shot 2016-02-15 at 23.27.44.png"/>
+          <p:cNvPr id="13" name="Picture 12">
+            <a:extLst>
+              <a:ext uri="{FF2B5EF4-FFF2-40B4-BE49-F238E27FC236}">
+                <a16:creationId xmlns:a16="http://schemas.microsoft.com/office/drawing/2014/main" id="{7F98811A-8298-DF43-8839-9C73D77BD564}"/>
+              </a:ext>
+            </a:extLst>
+          </p:cNvPr>
           <p:cNvPicPr>
             <a:picLocks noChangeAspect="1"/>
           </p:cNvPicPr>
           <p:nvPr/>
         </p:nvPicPr>
         <p:blipFill>
-          <a:blip r:embed="rId3">
-            <a:extLst>
-              <a:ext uri="{28A0092B-C50C-407E-A947-70E740481C1C}">
-                <a14:useLocalDpi xmlns:a14="http://schemas.microsoft.com/office/drawing/2010/main" val="0"/>
-              </a:ext>
-            </a:extLst>
-          </a:blip>
+          <a:blip r:embed="rId3"/>
           <a:stretch>
             <a:fillRect/>
           </a:stretch>
         </p:blipFill>
         <p:spPr>
           <a:xfrm>
-            <a:off x="6400800" y="1219200"/>
-            <a:ext cx="2514600" cy="1540042"/>
-          </a:xfrm>
-          <a:prstGeom prst="rect">
-            <a:avLst/>
-          </a:prstGeom>
-        </p:spPr>
-      </p:pic>
-      <p:pic>
-        <p:nvPicPr>
-          <p:cNvPr id="7" name="Picture 6" descr="Screen Shot 2016-02-15 at 23.33.40.png"/>
-          <p:cNvPicPr>
-            <a:picLocks noChangeAspect="1"/>
-          </p:cNvPicPr>
-          <p:nvPr/>
-        </p:nvPicPr>
-        <p:blipFill>
-          <a:blip r:embed="rId4">
-            <a:extLst>
-              <a:ext uri="{28A0092B-C50C-407E-A947-70E740481C1C}">
-                <a14:useLocalDpi xmlns:a14="http://schemas.microsoft.com/office/drawing/2010/main" val="0"/>
-              </a:ext>
-            </a:extLst>
-          </a:blip>
-          <a:stretch>
-            <a:fillRect/>
-          </a:stretch>
-        </p:blipFill>
-        <p:spPr>
-          <a:xfrm>
-            <a:off x="6400800" y="3048000"/>
-            <a:ext cx="2576945" cy="1447800"/>
-          </a:xfrm>
-          <a:prstGeom prst="rect">
-            <a:avLst/>
-          </a:prstGeom>
-        </p:spPr>
-      </p:pic>
-      <p:pic>
-        <p:nvPicPr>
-          <p:cNvPr id="10" name="Content Placeholder 9"/>
-          <p:cNvPicPr>
-            <a:picLocks noGrp="1" noChangeAspect="1"/>
-          </p:cNvPicPr>
-          <p:nvPr>
-            <p:ph idx="1"/>
-          </p:nvPr>
-        </p:nvPicPr>
-        <p:blipFill rotWithShape="1">
-          <a:blip r:embed="rId5"/>
-          <a:srcRect l="25380" t="33435" r="39299" b="31141"/>
-          <a:stretch/>
-        </p:blipFill>
-        <p:spPr>
-          <a:xfrm>
-            <a:off x="381000" y="1219200"/>
-            <a:ext cx="5867400" cy="5257800"/>
-          </a:xfrm>
-        </p:spPr>
-      </p:pic>
-      <p:pic>
-        <p:nvPicPr>
-          <p:cNvPr id="11" name="Picture 10" descr="Oracles.png"/>
-          <p:cNvPicPr>
-            <a:picLocks noChangeAspect="1"/>
-          </p:cNvPicPr>
-          <p:nvPr/>
-        </p:nvPicPr>
-        <p:blipFill>
-          <a:blip r:embed="rId6">
-            <a:extLst>
-              <a:ext uri="{28A0092B-C50C-407E-A947-70E740481C1C}">
-                <a14:useLocalDpi xmlns:a14="http://schemas.microsoft.com/office/drawing/2010/main" val="0"/>
-              </a:ext>
-            </a:extLst>
-          </a:blip>
-          <a:stretch>
-            <a:fillRect/>
-          </a:stretch>
-        </p:blipFill>
-        <p:spPr>
-          <a:xfrm>
-            <a:off x="6400800" y="4800600"/>
-            <a:ext cx="2590800" cy="1676400"/>
+            <a:off x="605082" y="2136531"/>
+            <a:ext cx="4581036" cy="3429000"/>
           </a:xfrm>
           <a:prstGeom prst="rect">
             <a:avLst/>
@@ -6224,7 +6149,128 @@
   <p:timing>
     <p:tnLst>
       <p:par>
-        <p:cTn xmlns:p14="http://schemas.microsoft.com/office/powerpoint/2010/main" id="1" dur="indefinite" restart="never" nodeType="tmRoot"/>
+        <p:cTn id="1" dur="indefinite" restart="never" nodeType="tmRoot">
+          <p:childTnLst>
+            <p:seq concurrent="1" nextAc="seek">
+              <p:cTn id="2" dur="indefinite" nodeType="mainSeq">
+                <p:childTnLst>
+                  <p:par>
+                    <p:cTn id="3" fill="hold">
+                      <p:stCondLst>
+                        <p:cond delay="indefinite"/>
+                      </p:stCondLst>
+                      <p:childTnLst>
+                        <p:par>
+                          <p:cTn id="4" fill="hold">
+                            <p:stCondLst>
+                              <p:cond delay="0"/>
+                            </p:stCondLst>
+                            <p:childTnLst>
+                              <p:par>
+                                <p:cTn id="5" presetID="1" presetClass="entr" presetSubtype="0" fill="hold" nodeType="clickEffect">
+                                  <p:stCondLst>
+                                    <p:cond delay="0"/>
+                                  </p:stCondLst>
+                                  <p:childTnLst>
+                                    <p:set>
+                                      <p:cBhvr>
+                                        <p:cTn id="6" dur="1" fill="hold">
+                                          <p:stCondLst>
+                                            <p:cond delay="0"/>
+                                          </p:stCondLst>
+                                        </p:cTn>
+                                        <p:tgtEl>
+                                          <p:spTgt spid="8">
+                                            <p:txEl>
+                                              <p:pRg st="1" end="1"/>
+                                            </p:txEl>
+                                          </p:spTgt>
+                                        </p:tgtEl>
+                                        <p:attrNameLst>
+                                          <p:attrName>style.visibility</p:attrName>
+                                        </p:attrNameLst>
+                                      </p:cBhvr>
+                                      <p:to>
+                                        <p:strVal val="visible"/>
+                                      </p:to>
+                                    </p:set>
+                                  </p:childTnLst>
+                                </p:cTn>
+                              </p:par>
+                            </p:childTnLst>
+                          </p:cTn>
+                        </p:par>
+                      </p:childTnLst>
+                    </p:cTn>
+                  </p:par>
+                  <p:par>
+                    <p:cTn id="7" fill="hold">
+                      <p:stCondLst>
+                        <p:cond delay="indefinite"/>
+                      </p:stCondLst>
+                      <p:childTnLst>
+                        <p:par>
+                          <p:cTn id="8" fill="hold">
+                            <p:stCondLst>
+                              <p:cond delay="0"/>
+                            </p:stCondLst>
+                            <p:childTnLst>
+                              <p:par>
+                                <p:cTn id="9" presetID="1" presetClass="entr" presetSubtype="0" fill="hold" nodeType="clickEffect">
+                                  <p:stCondLst>
+                                    <p:cond delay="0"/>
+                                  </p:stCondLst>
+                                  <p:childTnLst>
+                                    <p:set>
+                                      <p:cBhvr>
+                                        <p:cTn id="10" dur="1" fill="hold">
+                                          <p:stCondLst>
+                                            <p:cond delay="0"/>
+                                          </p:stCondLst>
+                                        </p:cTn>
+                                        <p:tgtEl>
+                                          <p:spTgt spid="8">
+                                            <p:txEl>
+                                              <p:pRg st="2" end="2"/>
+                                            </p:txEl>
+                                          </p:spTgt>
+                                        </p:tgtEl>
+                                        <p:attrNameLst>
+                                          <p:attrName>style.visibility</p:attrName>
+                                        </p:attrNameLst>
+                                      </p:cBhvr>
+                                      <p:to>
+                                        <p:strVal val="visible"/>
+                                      </p:to>
+                                    </p:set>
+                                  </p:childTnLst>
+                                </p:cTn>
+                              </p:par>
+                            </p:childTnLst>
+                          </p:cTn>
+                        </p:par>
+                      </p:childTnLst>
+                    </p:cTn>
+                  </p:par>
+                </p:childTnLst>
+              </p:cTn>
+              <p:prevCondLst>
+                <p:cond evt="onPrev" delay="0">
+                  <p:tgtEl>
+                    <p:sldTgt/>
+                  </p:tgtEl>
+                </p:cond>
+              </p:prevCondLst>
+              <p:nextCondLst>
+                <p:cond evt="onNext" delay="0">
+                  <p:tgtEl>
+                    <p:sldTgt/>
+                  </p:tgtEl>
+                </p:cond>
+              </p:nextCondLst>
+            </p:seq>
+          </p:childTnLst>
+        </p:cTn>
       </p:par>
     </p:tnLst>
   </p:timing>
@@ -6271,7 +6317,7 @@
           <a:lstStyle/>
           <a:p>
             <a:r>
-              <a:rPr lang="en-GB" sz="5400" b="1" dirty="0" smtClean="0">
+              <a:rPr lang="en-GB" sz="5400" b="1" dirty="0">
                 <a:solidFill>
                   <a:schemeClr val="bg1"/>
                 </a:solidFill>
@@ -6280,13 +6326,6 @@
               </a:rPr>
               <a:t>Summarise…</a:t>
             </a:r>
-            <a:endParaRPr lang="en-GB" sz="5400" b="1" dirty="0">
-              <a:solidFill>
-                <a:schemeClr val="bg1"/>
-              </a:solidFill>
-              <a:latin typeface="Courier New" pitchFamily="49" charset="0"/>
-              <a:cs typeface="Courier New" pitchFamily="49" charset="0"/>
-            </a:endParaRPr>
           </a:p>
         </p:txBody>
       </p:sp>
@@ -6313,7 +6352,7 @@
           <a:lstStyle/>
           <a:p>
             <a:r>
-              <a:rPr lang="en-GB" sz="6600" dirty="0" smtClean="0">
+              <a:rPr lang="en-GB" sz="6600" dirty="0">
                 <a:solidFill>
                   <a:schemeClr val="bg1"/>
                 </a:solidFill>
@@ -6325,7 +6364,7 @@
           </a:p>
           <a:p>
             <a:r>
-              <a:rPr lang="en-GB" sz="6600" dirty="0" smtClean="0">
+              <a:rPr lang="en-GB" sz="6600" dirty="0">
                 <a:solidFill>
                   <a:schemeClr val="bg1"/>
                 </a:solidFill>
@@ -6374,7 +6413,7 @@
   <p:timing>
     <p:tnLst>
       <p:par>
-        <p:cTn xmlns:p14="http://schemas.microsoft.com/office/powerpoint/2010/main" id="1" dur="indefinite" restart="never" nodeType="tmRoot">
+        <p:cTn id="1" dur="indefinite" restart="never" nodeType="tmRoot">
           <p:childTnLst>
             <p:seq concurrent="1" nextAc="seek">
               <p:cTn id="2" dur="indefinite" nodeType="mainSeq">

</xml_diff>

<commit_message>
Just about cracked Canvas now :)
</commit_message>
<xml_diff>
--- a/02 Exercise 2 - Puzzle/Architecture_Workshop_Exercise_2_Understand.pptx
+++ b/02 Exercise 2 - Puzzle/Architecture_Workshop_Exercise_2_Understand.pptx
@@ -229,7 +229,7 @@
           <a:p>
             <a:fld id="{14BAE693-6910-45CC-A0F0-E7002C65F0F7}" type="datetimeFigureOut">
               <a:rPr lang="en-GB" smtClean="0"/>
-              <a:t>21/05/2018</a:t>
+              <a:t>30/05/2018</a:t>
             </a:fld>
             <a:endParaRPr lang="en-GB"/>
           </a:p>
@@ -1349,7 +1349,7 @@
             <a:fld id="{1D8BD707-D9CF-40AE-B4C6-C98DA3205C09}" type="datetimeFigureOut">
               <a:rPr lang="en-US" smtClean="0"/>
               <a:pPr/>
-              <a:t>5/21/18</a:t>
+              <a:t>5/30/18</a:t>
             </a:fld>
             <a:endParaRPr lang="en-US"/>
           </a:p>
@@ -1514,7 +1514,7 @@
             <a:fld id="{1D8BD707-D9CF-40AE-B4C6-C98DA3205C09}" type="datetimeFigureOut">
               <a:rPr lang="en-US" smtClean="0"/>
               <a:pPr/>
-              <a:t>5/21/18</a:t>
+              <a:t>5/30/18</a:t>
             </a:fld>
             <a:endParaRPr lang="en-US"/>
           </a:p>
@@ -1689,7 +1689,7 @@
             <a:fld id="{1D8BD707-D9CF-40AE-B4C6-C98DA3205C09}" type="datetimeFigureOut">
               <a:rPr lang="en-US" smtClean="0"/>
               <a:pPr/>
-              <a:t>5/21/18</a:t>
+              <a:t>5/30/18</a:t>
             </a:fld>
             <a:endParaRPr lang="en-US"/>
           </a:p>
@@ -1854,7 +1854,7 @@
             <a:fld id="{1D8BD707-D9CF-40AE-B4C6-C98DA3205C09}" type="datetimeFigureOut">
               <a:rPr lang="en-US" smtClean="0"/>
               <a:pPr/>
-              <a:t>5/21/18</a:t>
+              <a:t>5/30/18</a:t>
             </a:fld>
             <a:endParaRPr lang="en-US"/>
           </a:p>
@@ -2096,7 +2096,7 @@
             <a:fld id="{1D8BD707-D9CF-40AE-B4C6-C98DA3205C09}" type="datetimeFigureOut">
               <a:rPr lang="en-US" smtClean="0"/>
               <a:pPr/>
-              <a:t>5/21/18</a:t>
+              <a:t>5/30/18</a:t>
             </a:fld>
             <a:endParaRPr lang="en-US"/>
           </a:p>
@@ -2378,7 +2378,7 @@
             <a:fld id="{1D8BD707-D9CF-40AE-B4C6-C98DA3205C09}" type="datetimeFigureOut">
               <a:rPr lang="en-US" smtClean="0"/>
               <a:pPr/>
-              <a:t>5/21/18</a:t>
+              <a:t>5/30/18</a:t>
             </a:fld>
             <a:endParaRPr lang="en-US"/>
           </a:p>
@@ -2794,7 +2794,7 @@
             <a:fld id="{1D8BD707-D9CF-40AE-B4C6-C98DA3205C09}" type="datetimeFigureOut">
               <a:rPr lang="en-US" smtClean="0"/>
               <a:pPr/>
-              <a:t>5/21/18</a:t>
+              <a:t>5/30/18</a:t>
             </a:fld>
             <a:endParaRPr lang="en-US"/>
           </a:p>
@@ -2908,7 +2908,7 @@
             <a:fld id="{1D8BD707-D9CF-40AE-B4C6-C98DA3205C09}" type="datetimeFigureOut">
               <a:rPr lang="en-US" smtClean="0"/>
               <a:pPr/>
-              <a:t>5/21/18</a:t>
+              <a:t>5/30/18</a:t>
             </a:fld>
             <a:endParaRPr lang="en-US"/>
           </a:p>
@@ -3000,7 +3000,7 @@
             <a:fld id="{1D8BD707-D9CF-40AE-B4C6-C98DA3205C09}" type="datetimeFigureOut">
               <a:rPr lang="en-US" smtClean="0"/>
               <a:pPr/>
-              <a:t>5/21/18</a:t>
+              <a:t>5/30/18</a:t>
             </a:fld>
             <a:endParaRPr lang="en-US"/>
           </a:p>
@@ -3272,7 +3272,7 @@
             <a:fld id="{1D8BD707-D9CF-40AE-B4C6-C98DA3205C09}" type="datetimeFigureOut">
               <a:rPr lang="en-US" smtClean="0"/>
               <a:pPr/>
-              <a:t>5/21/18</a:t>
+              <a:t>5/30/18</a:t>
             </a:fld>
             <a:endParaRPr lang="en-US"/>
           </a:p>
@@ -3521,7 +3521,7 @@
             <a:fld id="{1D8BD707-D9CF-40AE-B4C6-C98DA3205C09}" type="datetimeFigureOut">
               <a:rPr lang="en-US" smtClean="0"/>
               <a:pPr/>
-              <a:t>5/21/18</a:t>
+              <a:t>5/30/18</a:t>
             </a:fld>
             <a:endParaRPr lang="en-US"/>
           </a:p>
@@ -3735,7 +3735,7 @@
             <a:fld id="{1D8BD707-D9CF-40AE-B4C6-C98DA3205C09}" type="datetimeFigureOut">
               <a:rPr lang="en-US" smtClean="0"/>
               <a:pPr/>
-              <a:t>5/21/18</a:t>
+              <a:t>5/30/18</a:t>
             </a:fld>
             <a:endParaRPr lang="en-US"/>
           </a:p>
@@ -5887,7 +5887,7 @@
                 <a:latin typeface="Courier New" pitchFamily="49" charset="0"/>
                 <a:cs typeface="Courier New" pitchFamily="49" charset="0"/>
               </a:rPr>
-              <a:t>Par example…</a:t>
+              <a:t>For example…</a:t>
             </a:r>
           </a:p>
         </p:txBody>
@@ -5908,8 +5908,8 @@
         </p:nvSpPr>
         <p:spPr>
           <a:xfrm>
-            <a:off x="5334000" y="1295400"/>
-            <a:ext cx="3657600" cy="5181600"/>
+            <a:off x="5596759" y="1447800"/>
+            <a:ext cx="3276600" cy="5181600"/>
           </a:xfrm>
           <a:prstGeom prst="rect">
             <a:avLst/>
@@ -5917,7 +5917,7 @@
         </p:spPr>
         <p:txBody>
           <a:bodyPr vert="horz" lIns="91440" tIns="45720" rIns="91440" bIns="45720" rtlCol="0">
-            <a:normAutofit fontScale="77500" lnSpcReduction="20000"/>
+            <a:normAutofit fontScale="55000" lnSpcReduction="20000"/>
           </a:bodyPr>
           <a:lstStyle>
             <a:lvl1pPr marL="342900" indent="-342900" algn="l" defTabSz="914400" rtl="0" eaLnBrk="1" latinLnBrk="0" hangingPunct="1">
@@ -6089,7 +6089,19 @@
                 <a:latin typeface="Courier New" pitchFamily="49" charset="0"/>
                 <a:cs typeface="Courier New" pitchFamily="49" charset="0"/>
               </a:rPr>
-              <a:t>Start with the original diagram…</a:t>
+              <a:t>Start with the original diagram, then bugs, stories and data…</a:t>
+            </a:r>
+          </a:p>
+          <a:p>
+            <a:r>
+              <a:rPr lang="en-GB" sz="4400" dirty="0">
+                <a:solidFill>
+                  <a:schemeClr val="bg1"/>
+                </a:solidFill>
+                <a:latin typeface="Courier New" pitchFamily="49" charset="0"/>
+                <a:cs typeface="Courier New" pitchFamily="49" charset="0"/>
+              </a:rPr>
+              <a:t>Suggest drawing a layer at a time</a:t>
             </a:r>
           </a:p>
         </p:txBody>
@@ -6232,6 +6244,55 @@
                                           <p:spTgt spid="8">
                                             <p:txEl>
                                               <p:pRg st="2" end="2"/>
+                                            </p:txEl>
+                                          </p:spTgt>
+                                        </p:tgtEl>
+                                        <p:attrNameLst>
+                                          <p:attrName>style.visibility</p:attrName>
+                                        </p:attrNameLst>
+                                      </p:cBhvr>
+                                      <p:to>
+                                        <p:strVal val="visible"/>
+                                      </p:to>
+                                    </p:set>
+                                  </p:childTnLst>
+                                </p:cTn>
+                              </p:par>
+                            </p:childTnLst>
+                          </p:cTn>
+                        </p:par>
+                      </p:childTnLst>
+                    </p:cTn>
+                  </p:par>
+                  <p:par>
+                    <p:cTn id="11" fill="hold">
+                      <p:stCondLst>
+                        <p:cond delay="indefinite"/>
+                      </p:stCondLst>
+                      <p:childTnLst>
+                        <p:par>
+                          <p:cTn id="12" fill="hold">
+                            <p:stCondLst>
+                              <p:cond delay="0"/>
+                            </p:stCondLst>
+                            <p:childTnLst>
+                              <p:par>
+                                <p:cTn id="13" presetID="1" presetClass="entr" presetSubtype="0" fill="hold" nodeType="clickEffect">
+                                  <p:stCondLst>
+                                    <p:cond delay="0"/>
+                                  </p:stCondLst>
+                                  <p:childTnLst>
+                                    <p:set>
+                                      <p:cBhvr>
+                                        <p:cTn id="14" dur="1" fill="hold">
+                                          <p:stCondLst>
+                                            <p:cond delay="0"/>
+                                          </p:stCondLst>
+                                        </p:cTn>
+                                        <p:tgtEl>
+                                          <p:spTgt spid="8">
+                                            <p:txEl>
+                                              <p:pRg st="3" end="3"/>
                                             </p:txEl>
                                           </p:spTgt>
                                         </p:tgtEl>

</xml_diff>